<commit_message>
A few more updates
</commit_message>
<xml_diff>
--- a/docs/RavenDB.pptx
+++ b/docs/RavenDB.pptx
@@ -5,17 +5,19 @@
     <p:sldMasterId id="2147483660" r:id="rId1"/>
   </p:sldMasterIdLst>
   <p:notesMasterIdLst>
-    <p:notesMasterId r:id="rId10"/>
+    <p:notesMasterId r:id="rId12"/>
   </p:notesMasterIdLst>
   <p:sldIdLst>
     <p:sldId id="256" r:id="rId2"/>
     <p:sldId id="257" r:id="rId3"/>
     <p:sldId id="258" r:id="rId4"/>
-    <p:sldId id="259" r:id="rId5"/>
-    <p:sldId id="260" r:id="rId6"/>
-    <p:sldId id="263" r:id="rId7"/>
-    <p:sldId id="262" r:id="rId8"/>
-    <p:sldId id="261" r:id="rId9"/>
+    <p:sldId id="264" r:id="rId5"/>
+    <p:sldId id="259" r:id="rId6"/>
+    <p:sldId id="260" r:id="rId7"/>
+    <p:sldId id="263" r:id="rId8"/>
+    <p:sldId id="262" r:id="rId9"/>
+    <p:sldId id="265" r:id="rId10"/>
+    <p:sldId id="261" r:id="rId11"/>
   </p:sldIdLst>
   <p:sldSz cx="9144000" cy="6858000" type="screen4x3"/>
   <p:notesSz cx="6858000" cy="9144000"/>
@@ -199,7 +201,7 @@
           <a:p>
             <a:fld id="{6CBD5C98-7F79-422E-BD07-32DA2D269530}" type="datetimeFigureOut">
               <a:rPr lang="en-US" smtClean="0"/>
-              <a:t>2/13/2014</a:t>
+              <a:t>2/14/2014</a:t>
             </a:fld>
             <a:endParaRPr lang="en-US"/>
           </a:p>
@@ -643,11 +645,7 @@
           <a:p>
             <a:r>
               <a:rPr lang="en-US" baseline="0" dirty="0" smtClean="0"/>
-              <a:t>Reversibility </a:t>
-            </a:r>
-            <a:r>
-              <a:rPr lang="en-US" baseline="0" dirty="0" smtClean="0"/>
-              <a:t>is something Jeremy has talked about previously and it’s a concept that has been around for over a decade.  In brief, Reversibility means we can change our application easily when we’ve made the wrong decision.  This is especially important when we’re working with a new technology that might turn out to not be the right fit for our application.  In the case of </a:t>
+              <a:t>Reversibility is something Jeremy has talked about previously and it’s a concept that has been around for over a decade.  In brief, Reversibility means we can change our application easily when we’ve made the wrong decision.  This is especially important when we’re working with a new technology that might turn out to not be the right fit for our application.  In the case of </a:t>
             </a:r>
             <a:r>
               <a:rPr lang="en-US" baseline="0" dirty="0" err="1" smtClean="0"/>
@@ -871,7 +869,7 @@
           <a:p>
             <a:fld id="{9EA69067-E6A7-4411-95E7-7AC23FA09CA0}" type="slidenum">
               <a:rPr lang="en-US" smtClean="0"/>
-              <a:t>4</a:t>
+              <a:t>5</a:t>
             </a:fld>
             <a:endParaRPr lang="en-US"/>
           </a:p>
@@ -975,7 +973,7 @@
           <a:p>
             <a:fld id="{9EA69067-E6A7-4411-95E7-7AC23FA09CA0}" type="slidenum">
               <a:rPr lang="en-US" smtClean="0"/>
-              <a:t>5</a:t>
+              <a:t>6</a:t>
             </a:fld>
             <a:endParaRPr lang="en-US"/>
           </a:p>
@@ -1163,7 +1161,7 @@
           <a:p>
             <a:fld id="{9EA69067-E6A7-4411-95E7-7AC23FA09CA0}" type="slidenum">
               <a:rPr lang="en-US" smtClean="0"/>
-              <a:t>6</a:t>
+              <a:t>7</a:t>
             </a:fld>
             <a:endParaRPr lang="en-US"/>
           </a:p>
@@ -1247,7 +1245,7 @@
           <a:p>
             <a:fld id="{9EA69067-E6A7-4411-95E7-7AC23FA09CA0}" type="slidenum">
               <a:rPr lang="en-US" smtClean="0"/>
-              <a:t>7</a:t>
+              <a:t>8</a:t>
             </a:fld>
             <a:endParaRPr lang="en-US"/>
           </a:p>
@@ -1461,7 +1459,7 @@
             <a:fld id="{1D8BD707-D9CF-40AE-B4C6-C98DA3205C09}" type="datetimeFigureOut">
               <a:rPr lang="en-US" smtClean="0"/>
               <a:pPr/>
-              <a:t>2/13/2014</a:t>
+              <a:t>2/14/2014</a:t>
             </a:fld>
             <a:endParaRPr lang="en-US"/>
           </a:p>
@@ -1628,7 +1626,7 @@
             <a:fld id="{1D8BD707-D9CF-40AE-B4C6-C98DA3205C09}" type="datetimeFigureOut">
               <a:rPr lang="en-US" smtClean="0"/>
               <a:pPr/>
-              <a:t>2/13/2014</a:t>
+              <a:t>2/14/2014</a:t>
             </a:fld>
             <a:endParaRPr lang="en-US"/>
           </a:p>
@@ -1805,7 +1803,7 @@
             <a:fld id="{1D8BD707-D9CF-40AE-B4C6-C98DA3205C09}" type="datetimeFigureOut">
               <a:rPr lang="en-US" smtClean="0"/>
               <a:pPr/>
-              <a:t>2/13/2014</a:t>
+              <a:t>2/14/2014</a:t>
             </a:fld>
             <a:endParaRPr lang="en-US"/>
           </a:p>
@@ -1972,7 +1970,7 @@
             <a:fld id="{1D8BD707-D9CF-40AE-B4C6-C98DA3205C09}" type="datetimeFigureOut">
               <a:rPr lang="en-US" smtClean="0"/>
               <a:pPr/>
-              <a:t>2/13/2014</a:t>
+              <a:t>2/14/2014</a:t>
             </a:fld>
             <a:endParaRPr lang="en-US"/>
           </a:p>
@@ -2215,7 +2213,7 @@
             <a:fld id="{1D8BD707-D9CF-40AE-B4C6-C98DA3205C09}" type="datetimeFigureOut">
               <a:rPr lang="en-US" smtClean="0"/>
               <a:pPr/>
-              <a:t>2/13/2014</a:t>
+              <a:t>2/14/2014</a:t>
             </a:fld>
             <a:endParaRPr lang="en-US"/>
           </a:p>
@@ -2500,7 +2498,7 @@
             <a:fld id="{1D8BD707-D9CF-40AE-B4C6-C98DA3205C09}" type="datetimeFigureOut">
               <a:rPr lang="en-US" smtClean="0"/>
               <a:pPr/>
-              <a:t>2/13/2014</a:t>
+              <a:t>2/14/2014</a:t>
             </a:fld>
             <a:endParaRPr lang="en-US"/>
           </a:p>
@@ -2931,7 +2929,7 @@
             <a:fld id="{1D8BD707-D9CF-40AE-B4C6-C98DA3205C09}" type="datetimeFigureOut">
               <a:rPr lang="en-US" smtClean="0"/>
               <a:pPr/>
-              <a:t>2/13/2014</a:t>
+              <a:t>2/14/2014</a:t>
             </a:fld>
             <a:endParaRPr lang="en-US"/>
           </a:p>
@@ -3046,7 +3044,7 @@
             <a:fld id="{1D8BD707-D9CF-40AE-B4C6-C98DA3205C09}" type="datetimeFigureOut">
               <a:rPr lang="en-US" smtClean="0"/>
               <a:pPr/>
-              <a:t>2/13/2014</a:t>
+              <a:t>2/14/2014</a:t>
             </a:fld>
             <a:endParaRPr lang="en-US"/>
           </a:p>
@@ -3138,7 +3136,7 @@
             <a:fld id="{1D8BD707-D9CF-40AE-B4C6-C98DA3205C09}" type="datetimeFigureOut">
               <a:rPr lang="en-US" smtClean="0"/>
               <a:pPr/>
-              <a:t>2/13/2014</a:t>
+              <a:t>2/14/2014</a:t>
             </a:fld>
             <a:endParaRPr lang="en-US"/>
           </a:p>
@@ -3329,7 +3327,7 @@
             <a:fld id="{1D8BD707-D9CF-40AE-B4C6-C98DA3205C09}" type="datetimeFigureOut">
               <a:rPr lang="en-US" smtClean="0"/>
               <a:pPr/>
-              <a:t>2/13/2014</a:t>
+              <a:t>2/14/2014</a:t>
             </a:fld>
             <a:endParaRPr lang="en-US"/>
           </a:p>
@@ -3649,7 +3647,7 @@
             <a:fld id="{1D8BD707-D9CF-40AE-B4C6-C98DA3205C09}" type="datetimeFigureOut">
               <a:rPr lang="en-US" smtClean="0"/>
               <a:pPr/>
-              <a:t>2/13/2014</a:t>
+              <a:t>2/14/2014</a:t>
             </a:fld>
             <a:endParaRPr lang="en-US"/>
           </a:p>
@@ -4031,7 +4029,7 @@
             <a:fld id="{1D8BD707-D9CF-40AE-B4C6-C98DA3205C09}" type="datetimeFigureOut">
               <a:rPr lang="en-US" smtClean="0"/>
               <a:pPr/>
-              <a:t>2/13/2014</a:t>
+              <a:t>2/14/2014</a:t>
             </a:fld>
             <a:endParaRPr lang="en-US"/>
           </a:p>
@@ -4374,13 +4372,14 @@
           <a:bodyPr/>
           <a:lstStyle/>
           <a:p>
+            <a:pPr algn="ctr"/>
+            <a:r>
+              <a:rPr lang="en-US" dirty="0" smtClean="0"/>
+              <a:t>A look back at </a:t>
+            </a:r>
             <a:r>
               <a:rPr lang="en-US" dirty="0" err="1" smtClean="0"/>
               <a:t>RavenDB</a:t>
-            </a:r>
-            <a:r>
-              <a:rPr lang="en-US" dirty="0" smtClean="0"/>
-              <a:t> Review</a:t>
             </a:r>
             <a:endParaRPr lang="en-US" dirty="0"/>
           </a:p>
@@ -4447,12 +4446,219 @@
   </p:clrMapOvr>
   <mc:AlternateContent xmlns:mc="http://schemas.openxmlformats.org/markup-compatibility/2006">
     <mc:Choice xmlns:p14="http://schemas.microsoft.com/office/powerpoint/2010/main" Requires="p14">
-      <p:transition spd="med" p14:dur="700">
+      <p:transition p14:dur="350">
         <p:fade/>
       </p:transition>
     </mc:Choice>
     <mc:Fallback>
-      <p:transition spd="med">
+      <p:transition>
+        <p:fade/>
+      </p:transition>
+    </mc:Fallback>
+  </mc:AlternateContent>
+  <p:timing>
+    <p:tnLst>
+      <p:par>
+        <p:cTn id="1" dur="indefinite" restart="never" nodeType="tmRoot"/>
+      </p:par>
+    </p:tnLst>
+  </p:timing>
+</p:sld>
+</file>
+
+<file path=ppt/slides/slide10.xml><?xml version="1.0" encoding="utf-8"?>
+<p:sld xmlns:a="http://schemas.openxmlformats.org/drawingml/2006/main" xmlns:r="http://schemas.openxmlformats.org/officeDocument/2006/relationships" xmlns:p="http://schemas.openxmlformats.org/presentationml/2006/main">
+  <p:cSld>
+    <p:spTree>
+      <p:nvGrpSpPr>
+        <p:cNvPr id="1" name=""/>
+        <p:cNvGrpSpPr/>
+        <p:nvPr/>
+      </p:nvGrpSpPr>
+      <p:grpSpPr>
+        <a:xfrm>
+          <a:off x="0" y="0"/>
+          <a:ext cx="0" cy="0"/>
+          <a:chOff x="0" y="0"/>
+          <a:chExt cx="0" cy="0"/>
+        </a:xfrm>
+      </p:grpSpPr>
+      <p:sp>
+        <p:nvSpPr>
+          <p:cNvPr id="2" name="Title 1"/>
+          <p:cNvSpPr>
+            <a:spLocks noGrp="1"/>
+          </p:cNvSpPr>
+          <p:nvPr>
+            <p:ph type="title"/>
+          </p:nvPr>
+        </p:nvSpPr>
+        <p:spPr/>
+        <p:txBody>
+          <a:bodyPr/>
+          <a:lstStyle/>
+          <a:p>
+            <a:r>
+              <a:rPr lang="en-US" dirty="0" smtClean="0"/>
+              <a:t>Resources</a:t>
+            </a:r>
+            <a:endParaRPr lang="en-US" dirty="0"/>
+          </a:p>
+        </p:txBody>
+      </p:sp>
+      <p:sp>
+        <p:nvSpPr>
+          <p:cNvPr id="3" name="Content Placeholder 2"/>
+          <p:cNvSpPr>
+            <a:spLocks noGrp="1"/>
+          </p:cNvSpPr>
+          <p:nvPr>
+            <p:ph idx="1"/>
+          </p:nvPr>
+        </p:nvSpPr>
+        <p:spPr>
+          <a:xfrm>
+            <a:off x="457200" y="1600200"/>
+            <a:ext cx="7924800" cy="4800600"/>
+          </a:xfrm>
+        </p:spPr>
+        <p:txBody>
+          <a:bodyPr/>
+          <a:lstStyle/>
+          <a:p>
+            <a:r>
+              <a:rPr lang="en-US" dirty="0" smtClean="0"/>
+              <a:t>Documentation can be found </a:t>
+            </a:r>
+            <a:r>
+              <a:rPr lang="en-US" dirty="0"/>
+              <a:t>at </a:t>
+            </a:r>
+            <a:r>
+              <a:rPr lang="en-US" dirty="0">
+                <a:hlinkClick r:id="rId2"/>
+              </a:rPr>
+              <a:t>http://ravendb.net/docs</a:t>
+            </a:r>
+            <a:r>
+              <a:rPr lang="en-US" dirty="0" smtClean="0">
+                <a:hlinkClick r:id="rId2"/>
+              </a:rPr>
+              <a:t>/</a:t>
+            </a:r>
+            <a:endParaRPr lang="en-US" dirty="0" smtClean="0"/>
+          </a:p>
+          <a:p>
+            <a:r>
+              <a:rPr lang="en-US" dirty="0" smtClean="0"/>
+              <a:t>Mailing list</a:t>
+            </a:r>
+            <a:r>
+              <a:rPr lang="en-US" dirty="0"/>
+              <a:t>: </a:t>
+            </a:r>
+            <a:r>
+              <a:rPr lang="en-US" dirty="0">
+                <a:hlinkClick r:id="rId3"/>
+              </a:rPr>
+              <a:t>https://groups.google.com/forum/#!</a:t>
+            </a:r>
+            <a:r>
+              <a:rPr lang="en-US" dirty="0" smtClean="0">
+                <a:hlinkClick r:id="rId3"/>
+              </a:rPr>
+              <a:t>forum/ravendb</a:t>
+            </a:r>
+            <a:endParaRPr lang="en-US" dirty="0" smtClean="0"/>
+          </a:p>
+          <a:p>
+            <a:r>
+              <a:rPr lang="en-US" dirty="0" err="1" smtClean="0"/>
+              <a:t>GitHub</a:t>
+            </a:r>
+            <a:r>
+              <a:rPr lang="en-US" dirty="0"/>
+              <a:t>: </a:t>
+            </a:r>
+            <a:r>
+              <a:rPr lang="en-US" dirty="0">
+                <a:hlinkClick r:id="rId4"/>
+              </a:rPr>
+              <a:t>https://github.com/ravendb</a:t>
+            </a:r>
+            <a:r>
+              <a:rPr lang="en-US" dirty="0" smtClean="0">
+                <a:hlinkClick r:id="rId4"/>
+              </a:rPr>
+              <a:t>/</a:t>
+            </a:r>
+            <a:endParaRPr lang="en-US" dirty="0" smtClean="0"/>
+          </a:p>
+          <a:p>
+            <a:r>
+              <a:rPr lang="en-US" dirty="0" smtClean="0"/>
+              <a:t>Jeremy Miller on Reversibility: </a:t>
+            </a:r>
+          </a:p>
+          <a:p>
+            <a:pPr lvl="1"/>
+            <a:r>
+              <a:rPr lang="en-US" dirty="0">
+                <a:hlinkClick r:id="rId5"/>
+              </a:rPr>
+              <a:t>http://codebetter.com/jeremymiller/2008/02/11/first-causes-reversibility</a:t>
+            </a:r>
+            <a:r>
+              <a:rPr lang="en-US" dirty="0" smtClean="0">
+                <a:hlinkClick r:id="rId5"/>
+              </a:rPr>
+              <a:t>/</a:t>
+            </a:r>
+            <a:endParaRPr lang="en-US" dirty="0" smtClean="0"/>
+          </a:p>
+          <a:p>
+            <a:pPr lvl="1"/>
+            <a:r>
+              <a:rPr lang="en-US" dirty="0">
+                <a:hlinkClick r:id="rId6"/>
+              </a:rPr>
+              <a:t>http://jeremydmiller.com/2013/01/02/continuous-design-and-reversibility-at-agile-vancouver-video</a:t>
+            </a:r>
+            <a:r>
+              <a:rPr lang="en-US" dirty="0" smtClean="0">
+                <a:hlinkClick r:id="rId6"/>
+              </a:rPr>
+              <a:t>/</a:t>
+            </a:r>
+            <a:endParaRPr lang="en-US" dirty="0" smtClean="0"/>
+          </a:p>
+          <a:p>
+            <a:pPr lvl="1"/>
+            <a:endParaRPr lang="en-US" dirty="0" smtClean="0"/>
+          </a:p>
+          <a:p>
+            <a:endParaRPr lang="en-US" dirty="0"/>
+          </a:p>
+        </p:txBody>
+      </p:sp>
+    </p:spTree>
+    <p:extLst>
+      <p:ext uri="{BB962C8B-B14F-4D97-AF65-F5344CB8AC3E}">
+        <p14:creationId xmlns:p14="http://schemas.microsoft.com/office/powerpoint/2010/main" val="2591485194"/>
+      </p:ext>
+    </p:extLst>
+  </p:cSld>
+  <p:clrMapOvr>
+    <a:masterClrMapping/>
+  </p:clrMapOvr>
+  <mc:AlternateContent xmlns:mc="http://schemas.openxmlformats.org/markup-compatibility/2006">
+    <mc:Choice xmlns:p14="http://schemas.microsoft.com/office/powerpoint/2010/main" Requires="p14">
+      <p:transition p14:dur="350">
+        <p:fade/>
+      </p:transition>
+    </mc:Choice>
+    <mc:Fallback>
+      <p:transition>
         <p:fade/>
       </p:transition>
     </mc:Fallback>
@@ -4629,12 +4835,12 @@
   </p:clrMapOvr>
   <mc:AlternateContent xmlns:mc="http://schemas.openxmlformats.org/markup-compatibility/2006">
     <mc:Choice xmlns:p14="http://schemas.microsoft.com/office/powerpoint/2010/main" Requires="p14">
-      <p:transition spd="med" p14:dur="700">
+      <p:transition p14:dur="350">
         <p:fade/>
       </p:transition>
     </mc:Choice>
     <mc:Fallback>
-      <p:transition spd="med">
+      <p:transition>
         <p:fade/>
       </p:transition>
     </mc:Fallback>
@@ -4807,12 +5013,12 @@
   </p:clrMapOvr>
   <mc:AlternateContent xmlns:mc="http://schemas.openxmlformats.org/markup-compatibility/2006">
     <mc:Choice xmlns:p14="http://schemas.microsoft.com/office/powerpoint/2010/main" Requires="p14">
-      <p:transition spd="med" p14:dur="700">
+      <p:transition p14:dur="350">
         <p:fade/>
       </p:transition>
     </mc:Choice>
     <mc:Fallback>
-      <p:transition spd="med">
+      <p:transition>
         <p:fade/>
       </p:transition>
     </mc:Fallback>
@@ -4861,7 +5067,7 @@
           <a:p>
             <a:r>
               <a:rPr lang="en-US" dirty="0" smtClean="0"/>
-              <a:t>Indexes</a:t>
+              <a:t>Safe by Default</a:t>
             </a:r>
             <a:endParaRPr lang="en-US" dirty="0"/>
           </a:p>
@@ -4880,7 +5086,7 @@
         <p:spPr>
           <a:xfrm>
             <a:off x="457200" y="1600200"/>
-            <a:ext cx="7696200" cy="4800600"/>
+            <a:ext cx="7924800" cy="4800600"/>
           </a:xfrm>
         </p:spPr>
         <p:txBody>
@@ -4889,89 +5095,87 @@
           <a:p>
             <a:r>
               <a:rPr lang="en-US" dirty="0" smtClean="0"/>
-              <a:t>Auto indexes are a very easy start point</a:t>
+              <a:t>Unbounded queries return the first </a:t>
+            </a:r>
+            <a:r>
+              <a:rPr lang="en-US" b="1" dirty="0" smtClean="0"/>
+              <a:t>128</a:t>
+            </a:r>
+            <a:r>
+              <a:rPr lang="en-US" dirty="0" smtClean="0"/>
+              <a:t> results</a:t>
             </a:r>
           </a:p>
           <a:p>
             <a:pPr lvl="1"/>
             <a:r>
               <a:rPr lang="en-US" dirty="0" smtClean="0"/>
-              <a:t>Will be automatically disabled if not accessed after a while</a:t>
-            </a:r>
-          </a:p>
-          <a:p>
-            <a:r>
-              <a:rPr lang="en-US" dirty="0" smtClean="0"/>
-              <a:t>Static indexes are still recommended for most operations</a:t>
+              <a:t>Use Take() to adjust this, up to a maximum of </a:t>
+            </a:r>
+            <a:r>
+              <a:rPr lang="en-US" b="1" dirty="0" smtClean="0"/>
+              <a:t>1024</a:t>
+            </a:r>
+            <a:r>
+              <a:rPr lang="en-US" dirty="0" smtClean="0"/>
+              <a:t> results</a:t>
             </a:r>
           </a:p>
           <a:p>
             <a:pPr lvl="1"/>
             <a:r>
               <a:rPr lang="en-US" dirty="0" smtClean="0"/>
-              <a:t>Inherit from </a:t>
+              <a:t>Use </a:t>
             </a:r>
             <a:r>
               <a:rPr lang="en-US" dirty="0" err="1" smtClean="0"/>
-              <a:t>AbstractIndexCreationTask</a:t>
+              <a:t>session.Advanced.Stream</a:t>
+            </a:r>
+            <a:r>
+              <a:rPr lang="en-US" dirty="0" smtClean="0"/>
+              <a:t>() if you really need it</a:t>
+            </a:r>
+          </a:p>
+          <a:p>
+            <a:r>
+              <a:rPr lang="en-US" dirty="0" smtClean="0"/>
+              <a:t>A session has a default limit of </a:t>
+            </a:r>
+            <a:r>
+              <a:rPr lang="en-US" b="1" dirty="0" smtClean="0"/>
+              <a:t>30</a:t>
+            </a:r>
+            <a:r>
+              <a:rPr lang="en-US" dirty="0" smtClean="0"/>
+              <a:t> remote calls</a:t>
+            </a:r>
+          </a:p>
+          <a:p>
+            <a:r>
+              <a:rPr lang="en-US" dirty="0" smtClean="0"/>
+              <a:t>A session can override this limit by setting </a:t>
+            </a:r>
+            <a:r>
+              <a:rPr lang="en-US" dirty="0" err="1" smtClean="0"/>
+              <a:t>IDocumentSession.Advanced.MaxNumberOfRequestsPerSession</a:t>
             </a:r>
             <a:endParaRPr lang="en-US" dirty="0" smtClean="0"/>
           </a:p>
           <a:p>
-            <a:pPr lvl="1"/>
-            <a:r>
-              <a:rPr lang="en-US" dirty="0" smtClean="0"/>
-              <a:t>Call </a:t>
+            <a:r>
+              <a:rPr lang="en-US" dirty="0" smtClean="0"/>
+              <a:t>Or application wide through </a:t>
             </a:r>
             <a:r>
               <a:rPr lang="en-US" dirty="0" err="1" smtClean="0"/>
-              <a:t>IndexCreation.CreateIndexes</a:t>
-            </a:r>
-            <a:r>
-              <a:rPr lang="en-US" dirty="0" smtClean="0"/>
-              <a:t>() on app startup</a:t>
-            </a:r>
-          </a:p>
-          <a:p>
-            <a:pPr lvl="1"/>
-            <a:r>
-              <a:rPr lang="en-US" dirty="0" smtClean="0"/>
-              <a:t>Indexes can be locked from the studio if you’ve made manual changes and haven’t deployed your app yet.</a:t>
-            </a:r>
-          </a:p>
-          <a:p>
-            <a:pPr lvl="1"/>
-            <a:r>
-              <a:rPr lang="en-US" dirty="0" smtClean="0"/>
-              <a:t>The different options on an index can be confusing</a:t>
-            </a:r>
-          </a:p>
-          <a:p>
-            <a:pPr lvl="1"/>
-            <a:r>
-              <a:rPr lang="en-US" dirty="0" smtClean="0"/>
-              <a:t>An auto index can be a good starting point</a:t>
-            </a:r>
-          </a:p>
-          <a:p>
-            <a:r>
-              <a:rPr lang="en-US" dirty="0" smtClean="0"/>
-              <a:t>Queries don’t need to be modified, </a:t>
-            </a:r>
-            <a:r>
-              <a:rPr lang="en-US" dirty="0" err="1" smtClean="0"/>
-              <a:t>RavenDB</a:t>
-            </a:r>
-            <a:r>
-              <a:rPr lang="en-US" dirty="0" smtClean="0"/>
-              <a:t> will automatically choose the appropriate index</a:t>
-            </a:r>
-          </a:p>
-          <a:p>
-            <a:pPr lvl="1"/>
-            <a:r>
-              <a:rPr lang="en-US" dirty="0" smtClean="0"/>
-              <a:t>You can optionally specify which index to use when calling Query()</a:t>
+              <a:t>IDocumentStore.Conventions.MaxNumberOfRequestsPerSession</a:t>
+            </a:r>
+            <a:endParaRPr lang="en-US" dirty="0" smtClean="0"/>
+          </a:p>
+          <a:p>
+            <a:r>
+              <a:rPr lang="en-US" dirty="0" smtClean="0"/>
+              <a:t>If you find yourself hitting this limit, you probably need to rethink your approach</a:t>
             </a:r>
             <a:endParaRPr lang="en-US" dirty="0"/>
           </a:p>
@@ -4980,7 +5184,7 @@
     </p:spTree>
     <p:extLst>
       <p:ext uri="{BB962C8B-B14F-4D97-AF65-F5344CB8AC3E}">
-        <p14:creationId xmlns:p14="http://schemas.microsoft.com/office/powerpoint/2010/main" val="3768422466"/>
+        <p14:creationId xmlns:p14="http://schemas.microsoft.com/office/powerpoint/2010/main" val="610810724"/>
       </p:ext>
     </p:extLst>
   </p:cSld>
@@ -4989,12 +5193,12 @@
   </p:clrMapOvr>
   <mc:AlternateContent xmlns:mc="http://schemas.openxmlformats.org/markup-compatibility/2006">
     <mc:Choice xmlns:p14="http://schemas.microsoft.com/office/powerpoint/2010/main" Requires="p14">
-      <p:transition spd="med" p14:dur="700">
+      <p:transition p14:dur="350">
         <p:fade/>
       </p:transition>
     </mc:Choice>
     <mc:Fallback>
-      <p:transition spd="med">
+      <p:transition>
         <p:fade/>
       </p:transition>
     </mc:Fallback>
@@ -5043,7 +5247,7 @@
           <a:p>
             <a:r>
               <a:rPr lang="en-US" dirty="0" smtClean="0"/>
-              <a:t>Replication</a:t>
+              <a:t>Indexes</a:t>
             </a:r>
             <a:endParaRPr lang="en-US" dirty="0"/>
           </a:p>
@@ -5059,14 +5263,43 @@
             <p:ph idx="1"/>
           </p:nvPr>
         </p:nvSpPr>
-        <p:spPr/>
-        <p:txBody>
-          <a:bodyPr/>
-          <a:lstStyle/>
-          <a:p>
+        <p:spPr>
+          <a:xfrm>
+            <a:off x="457200" y="1600200"/>
+            <a:ext cx="7696200" cy="4800600"/>
+          </a:xfrm>
+        </p:spPr>
+        <p:txBody>
+          <a:bodyPr/>
+          <a:lstStyle/>
+          <a:p>
+            <a:r>
+              <a:rPr lang="en-US" dirty="0" smtClean="0"/>
+              <a:t>Auto indexes are a very easy start point</a:t>
+            </a:r>
+          </a:p>
+          <a:p>
+            <a:pPr lvl="1"/>
+            <a:r>
+              <a:rPr lang="en-US" dirty="0" smtClean="0"/>
+              <a:t>Will be automatically disabled if not accessed after a while</a:t>
+            </a:r>
+          </a:p>
+          <a:p>
+            <a:r>
+              <a:rPr lang="en-US" dirty="0" smtClean="0"/>
+              <a:t>Static indexes are still recommended for most operations</a:t>
+            </a:r>
+          </a:p>
+          <a:p>
+            <a:pPr lvl="1"/>
+            <a:r>
+              <a:rPr lang="en-US" dirty="0" smtClean="0"/>
+              <a:t>Inherit from </a:t>
+            </a:r>
             <a:r>
               <a:rPr lang="en-US" dirty="0" err="1" smtClean="0"/>
-              <a:t>FailoverBehavior</a:t>
+              <a:t>AbstractIndexCreationTask</a:t>
             </a:r>
             <a:endParaRPr lang="en-US" dirty="0" smtClean="0"/>
           </a:p>
@@ -5074,72 +5307,57 @@
             <a:pPr lvl="1"/>
             <a:r>
               <a:rPr lang="en-US" dirty="0" smtClean="0"/>
-              <a:t>Default is </a:t>
+              <a:t>Call </a:t>
             </a:r>
             <a:r>
               <a:rPr lang="en-US" dirty="0" err="1" smtClean="0"/>
-              <a:t>AllowReadsFromSecondaries</a:t>
-            </a:r>
-            <a:r>
-              <a:rPr lang="en-US" dirty="0" smtClean="0"/>
-              <a:t> (no writes)</a:t>
+              <a:t>IndexCreation.CreateIndexes</a:t>
+            </a:r>
+            <a:r>
+              <a:rPr lang="en-US" dirty="0" smtClean="0"/>
+              <a:t>() on app startup</a:t>
             </a:r>
           </a:p>
           <a:p>
             <a:pPr lvl="1"/>
             <a:r>
+              <a:rPr lang="en-US" dirty="0" smtClean="0"/>
+              <a:t>Indexes can be locked from the studio if you’ve made manual changes and haven’t deployed your app yet.</a:t>
+            </a:r>
+          </a:p>
+          <a:p>
+            <a:pPr lvl="1"/>
+            <a:r>
+              <a:rPr lang="en-US" dirty="0" smtClean="0"/>
+              <a:t>The different options on an index can be confusing</a:t>
+            </a:r>
+          </a:p>
+          <a:p>
+            <a:pPr lvl="1"/>
+            <a:r>
+              <a:rPr lang="en-US" dirty="0" smtClean="0"/>
+              <a:t>An auto index can be a good starting point</a:t>
+            </a:r>
+          </a:p>
+          <a:p>
+            <a:r>
+              <a:rPr lang="en-US" dirty="0" smtClean="0"/>
+              <a:t>Queries don’t need to be modified, </a:t>
+            </a:r>
+            <a:r>
               <a:rPr lang="en-US" dirty="0" err="1" smtClean="0"/>
-              <a:t>AllowReadsFromSecondariesAndWritesToSecondaries</a:t>
-            </a:r>
-            <a:endParaRPr lang="en-US" dirty="0" smtClean="0"/>
+              <a:t>RavenDB</a:t>
+            </a:r>
+            <a:r>
+              <a:rPr lang="en-US" dirty="0" smtClean="0"/>
+              <a:t> will automatically choose the appropriate index</a:t>
+            </a:r>
           </a:p>
           <a:p>
             <a:pPr lvl="1"/>
             <a:r>
-              <a:rPr lang="en-US" dirty="0" err="1" smtClean="0"/>
-              <a:t>FailImmediately</a:t>
-            </a:r>
-            <a:endParaRPr lang="en-US" dirty="0" smtClean="0"/>
-          </a:p>
-          <a:p>
-            <a:pPr lvl="1"/>
-            <a:r>
-              <a:rPr lang="en-US" dirty="0" err="1" smtClean="0"/>
-              <a:t>ReadFromAllServers</a:t>
-            </a:r>
-            <a:endParaRPr lang="en-US" dirty="0" smtClean="0"/>
-          </a:p>
-          <a:p>
-            <a:r>
-              <a:rPr lang="en-US" dirty="0"/>
-              <a:t>Master-slave</a:t>
-            </a:r>
-          </a:p>
-          <a:p>
-            <a:pPr lvl="1"/>
-            <a:r>
-              <a:rPr lang="en-US" dirty="0"/>
-              <a:t>Provides failover but changes on the slave are not replicated back to the master node.</a:t>
-            </a:r>
-          </a:p>
-          <a:p>
-            <a:r>
-              <a:rPr lang="en-US" dirty="0" smtClean="0"/>
-              <a:t>Master-master</a:t>
-            </a:r>
-          </a:p>
-          <a:p>
-            <a:pPr lvl="1"/>
-            <a:r>
-              <a:rPr lang="en-US" dirty="0" smtClean="0"/>
-              <a:t>Writes to the primary server as long as it is up.</a:t>
-            </a:r>
-          </a:p>
-          <a:p>
-            <a:pPr lvl="1"/>
-            <a:r>
-              <a:rPr lang="en-US" dirty="0" smtClean="0"/>
-              <a:t>Writes to the secondary get replicated back to the primary when it comes back online.</a:t>
+              <a:rPr lang="en-US" dirty="0" smtClean="0"/>
+              <a:t>You can optionally specify which index to use when calling Query()</a:t>
             </a:r>
             <a:endParaRPr lang="en-US" dirty="0"/>
           </a:p>
@@ -5148,7 +5366,7 @@
     </p:spTree>
     <p:extLst>
       <p:ext uri="{BB962C8B-B14F-4D97-AF65-F5344CB8AC3E}">
-        <p14:creationId xmlns:p14="http://schemas.microsoft.com/office/powerpoint/2010/main" val="3550692995"/>
+        <p14:creationId xmlns:p14="http://schemas.microsoft.com/office/powerpoint/2010/main" val="3768422466"/>
       </p:ext>
     </p:extLst>
   </p:cSld>
@@ -5157,12 +5375,12 @@
   </p:clrMapOvr>
   <mc:AlternateContent xmlns:mc="http://schemas.openxmlformats.org/markup-compatibility/2006">
     <mc:Choice xmlns:p14="http://schemas.microsoft.com/office/powerpoint/2010/main" Requires="p14">
-      <p:transition spd="med" p14:dur="700">
+      <p:transition p14:dur="350">
         <p:fade/>
       </p:transition>
     </mc:Choice>
     <mc:Fallback>
-      <p:transition spd="med">
+      <p:transition>
         <p:fade/>
       </p:transition>
     </mc:Fallback>
@@ -5211,7 +5429,7 @@
           <a:p>
             <a:r>
               <a:rPr lang="en-US" dirty="0" smtClean="0"/>
-              <a:t>Conflicts</a:t>
+              <a:t>Replication</a:t>
             </a:r>
             <a:endParaRPr lang="en-US" dirty="0"/>
           </a:p>
@@ -5233,71 +5451,81 @@
           <a:lstStyle/>
           <a:p>
             <a:r>
-              <a:rPr lang="en-US" dirty="0" smtClean="0"/>
-              <a:t>Resolve manually through the studio</a:t>
-            </a:r>
-          </a:p>
-          <a:p>
-            <a:r>
-              <a:rPr lang="en-US" dirty="0" smtClean="0"/>
-              <a:t>Handle them in your application by catching </a:t>
-            </a:r>
-            <a:r>
               <a:rPr lang="en-US" dirty="0" err="1" smtClean="0"/>
-              <a:t>ConflictExceptions</a:t>
-            </a:r>
-            <a:r>
-              <a:rPr lang="en-US" dirty="0" smtClean="0"/>
-              <a:t> (not recommended)</a:t>
-            </a:r>
-          </a:p>
-          <a:p>
-            <a:r>
-              <a:rPr lang="en-US" dirty="0" smtClean="0"/>
-              <a:t>Or </a:t>
-            </a:r>
+              <a:t>FailoverBehavior</a:t>
+            </a:r>
+            <a:endParaRPr lang="en-US" dirty="0" smtClean="0"/>
+          </a:p>
+          <a:p>
+            <a:pPr lvl="1"/>
+            <a:r>
+              <a:rPr lang="en-US" dirty="0" smtClean="0"/>
+              <a:t>Default is </a:t>
+            </a:r>
+            <a:r>
+              <a:rPr lang="en-US" dirty="0" err="1" smtClean="0"/>
+              <a:t>AllowReadsFromSecondaries</a:t>
+            </a:r>
+            <a:r>
+              <a:rPr lang="en-US" dirty="0" smtClean="0"/>
+              <a:t> (no writes)</a:t>
+            </a:r>
+          </a:p>
+          <a:p>
+            <a:pPr lvl="1"/>
+            <a:r>
+              <a:rPr lang="en-US" dirty="0" err="1" smtClean="0"/>
+              <a:t>AllowReadsFromSecondariesAndWritesToSecondaries</a:t>
+            </a:r>
+            <a:endParaRPr lang="en-US" dirty="0" smtClean="0"/>
+          </a:p>
+          <a:p>
+            <a:pPr lvl="1"/>
+            <a:r>
+              <a:rPr lang="en-US" dirty="0" err="1" smtClean="0"/>
+              <a:t>FailImmediately</a:t>
+            </a:r>
+            <a:endParaRPr lang="en-US" dirty="0" smtClean="0"/>
+          </a:p>
+          <a:p>
+            <a:pPr lvl="1"/>
+            <a:r>
+              <a:rPr lang="en-US" dirty="0" err="1" smtClean="0"/>
+              <a:t>ReadFromAllServers</a:t>
+            </a:r>
+            <a:endParaRPr lang="en-US" dirty="0" smtClean="0"/>
+          </a:p>
+          <a:p>
             <a:r>
               <a:rPr lang="en-US" dirty="0"/>
-              <a:t>by implementing an </a:t>
-            </a:r>
-            <a:r>
-              <a:rPr lang="en-US" dirty="0" err="1" smtClean="0"/>
-              <a:t>IDocumentConflictListener</a:t>
-            </a:r>
-            <a:endParaRPr lang="en-US" dirty="0" smtClean="0"/>
-          </a:p>
-          <a:p>
-            <a:r>
-              <a:rPr lang="en-US" dirty="0" smtClean="0"/>
-              <a:t>Or handle them on the server by writing an </a:t>
-            </a:r>
-            <a:r>
-              <a:rPr lang="en-US" dirty="0" err="1" smtClean="0"/>
-              <a:t>AbstractDocumentReplicationConflictResolver</a:t>
-            </a:r>
-            <a:endParaRPr lang="en-US" dirty="0" smtClean="0"/>
+              <a:t>Master-slave</a:t>
+            </a:r>
           </a:p>
           <a:p>
             <a:pPr lvl="1"/>
             <a:r>
-              <a:rPr lang="en-US" dirty="0" smtClean="0"/>
-              <a:t>Place the </a:t>
-            </a:r>
-            <a:r>
-              <a:rPr lang="en-US" dirty="0" err="1" smtClean="0"/>
-              <a:t>dll</a:t>
-            </a:r>
-            <a:r>
-              <a:rPr lang="en-US" dirty="0" smtClean="0"/>
-              <a:t> into the Plugins folder of the </a:t>
-            </a:r>
-            <a:r>
-              <a:rPr lang="en-US" dirty="0" err="1" smtClean="0"/>
-              <a:t>RavenDB</a:t>
-            </a:r>
-            <a:r>
-              <a:rPr lang="en-US" dirty="0" smtClean="0"/>
-              <a:t> process</a:t>
+              <a:rPr lang="en-US" dirty="0"/>
+              <a:t>Provides failover but changes on the slave are not replicated back to the master node.</a:t>
+            </a:r>
+          </a:p>
+          <a:p>
+            <a:r>
+              <a:rPr lang="en-US" dirty="0" smtClean="0"/>
+              <a:t>Master-master</a:t>
+            </a:r>
+          </a:p>
+          <a:p>
+            <a:pPr lvl="1"/>
+            <a:r>
+              <a:rPr lang="en-US" dirty="0" smtClean="0"/>
+              <a:t>Writes to the primary server as long as it is up.</a:t>
+            </a:r>
+          </a:p>
+          <a:p>
+            <a:pPr lvl="1"/>
+            <a:r>
+              <a:rPr lang="en-US" dirty="0" smtClean="0"/>
+              <a:t>Writes to the secondary get replicated back to the primary when it comes back online.</a:t>
             </a:r>
             <a:endParaRPr lang="en-US" dirty="0"/>
           </a:p>
@@ -5306,7 +5534,7 @@
     </p:spTree>
     <p:extLst>
       <p:ext uri="{BB962C8B-B14F-4D97-AF65-F5344CB8AC3E}">
-        <p14:creationId xmlns:p14="http://schemas.microsoft.com/office/powerpoint/2010/main" val="746222546"/>
+        <p14:creationId xmlns:p14="http://schemas.microsoft.com/office/powerpoint/2010/main" val="3550692995"/>
       </p:ext>
     </p:extLst>
   </p:cSld>
@@ -5315,12 +5543,12 @@
   </p:clrMapOvr>
   <mc:AlternateContent xmlns:mc="http://schemas.openxmlformats.org/markup-compatibility/2006">
     <mc:Choice xmlns:p14="http://schemas.microsoft.com/office/powerpoint/2010/main" Requires="p14">
-      <p:transition spd="med" p14:dur="700">
+      <p:transition p14:dur="350">
         <p:fade/>
       </p:transition>
     </mc:Choice>
     <mc:Fallback>
-      <p:transition spd="med">
+      <p:transition>
         <p:fade/>
       </p:transition>
     </mc:Fallback>
@@ -5369,7 +5597,7 @@
           <a:p>
             <a:r>
               <a:rPr lang="en-US" dirty="0" smtClean="0"/>
-              <a:t>Backup/Restore</a:t>
+              <a:t>Conflicts</a:t>
             </a:r>
             <a:endParaRPr lang="en-US" dirty="0"/>
           </a:p>
@@ -5392,51 +5620,70 @@
           <a:p>
             <a:r>
               <a:rPr lang="en-US" dirty="0" smtClean="0"/>
-              <a:t>IT is creating nightly and incremental backups using VSS</a:t>
-            </a:r>
-          </a:p>
-          <a:p>
-            <a:r>
-              <a:rPr lang="en-US" dirty="0" smtClean="0"/>
-              <a:t>We can also create backups through the studio or Raven.Backup.exe</a:t>
-            </a:r>
-          </a:p>
-          <a:p>
-            <a:r>
-              <a:rPr lang="en-US" dirty="0" smtClean="0"/>
-              <a:t>Restore is an offline operation</a:t>
-            </a:r>
+              <a:t>Resolve manually through the studio</a:t>
+            </a:r>
+          </a:p>
+          <a:p>
+            <a:r>
+              <a:rPr lang="en-US" dirty="0" smtClean="0"/>
+              <a:t>Handle them in your application by catching </a:t>
+            </a:r>
+            <a:r>
+              <a:rPr lang="en-US" dirty="0" err="1" smtClean="0"/>
+              <a:t>ConflictExceptions</a:t>
+            </a:r>
+            <a:r>
+              <a:rPr lang="en-US" dirty="0" smtClean="0"/>
+              <a:t> (not recommended)</a:t>
+            </a:r>
+          </a:p>
+          <a:p>
+            <a:r>
+              <a:rPr lang="en-US" dirty="0" smtClean="0"/>
+              <a:t>Or </a:t>
+            </a:r>
+            <a:r>
+              <a:rPr lang="en-US" dirty="0"/>
+              <a:t>by implementing an </a:t>
+            </a:r>
+            <a:r>
+              <a:rPr lang="en-US" dirty="0" err="1" smtClean="0"/>
+              <a:t>IDocumentConflictListener</a:t>
+            </a:r>
+            <a:endParaRPr lang="en-US" dirty="0" smtClean="0"/>
+          </a:p>
+          <a:p>
+            <a:r>
+              <a:rPr lang="en-US" dirty="0" smtClean="0"/>
+              <a:t>Or handle them on the server by writing an </a:t>
+            </a:r>
+            <a:r>
+              <a:rPr lang="en-US" dirty="0" err="1" smtClean="0"/>
+              <a:t>AbstractDocumentReplicationConflictResolver</a:t>
+            </a:r>
+            <a:endParaRPr lang="en-US" dirty="0" smtClean="0"/>
           </a:p>
           <a:p>
             <a:pPr lvl="1"/>
             <a:r>
               <a:rPr lang="en-US" dirty="0" smtClean="0"/>
-              <a:t>VSS backups are restored by copying the data back to the original location and starting </a:t>
+              <a:t>Place the </a:t>
+            </a:r>
+            <a:r>
+              <a:rPr lang="en-US" dirty="0" err="1" smtClean="0"/>
+              <a:t>dll</a:t>
+            </a:r>
+            <a:r>
+              <a:rPr lang="en-US" dirty="0" smtClean="0"/>
+              <a:t> into the Plugins folder of the </a:t>
             </a:r>
             <a:r>
               <a:rPr lang="en-US" dirty="0" err="1" smtClean="0"/>
               <a:t>RavenDB</a:t>
             </a:r>
-            <a:endParaRPr lang="en-US" dirty="0" smtClean="0"/>
-          </a:p>
-          <a:p>
-            <a:pPr lvl="1"/>
-            <a:r>
-              <a:rPr lang="en-US" dirty="0" smtClean="0"/>
-              <a:t>Other backups can be restored through the studio or Raven.Backup.exe</a:t>
-            </a:r>
-          </a:p>
-          <a:p>
-            <a:r>
-              <a:rPr lang="en-US" dirty="0" smtClean="0"/>
-              <a:t>Import/Export can also come in handy</a:t>
-            </a:r>
-          </a:p>
-          <a:p>
-            <a:pPr lvl="1"/>
-            <a:r>
-              <a:rPr lang="en-US" dirty="0" smtClean="0"/>
-              <a:t>Can be done through the studio or by using Raven.Smuggler.exe</a:t>
+            <a:r>
+              <a:rPr lang="en-US" dirty="0" smtClean="0"/>
+              <a:t> process</a:t>
             </a:r>
             <a:endParaRPr lang="en-US" dirty="0"/>
           </a:p>
@@ -5445,7 +5692,7 @@
     </p:spTree>
     <p:extLst>
       <p:ext uri="{BB962C8B-B14F-4D97-AF65-F5344CB8AC3E}">
-        <p14:creationId xmlns:p14="http://schemas.microsoft.com/office/powerpoint/2010/main" val="2691524604"/>
+        <p14:creationId xmlns:p14="http://schemas.microsoft.com/office/powerpoint/2010/main" val="746222546"/>
       </p:ext>
     </p:extLst>
   </p:cSld>
@@ -5454,12 +5701,12 @@
   </p:clrMapOvr>
   <mc:AlternateContent xmlns:mc="http://schemas.openxmlformats.org/markup-compatibility/2006">
     <mc:Choice xmlns:p14="http://schemas.microsoft.com/office/powerpoint/2010/main" Requires="p14">
-      <p:transition spd="med" p14:dur="700">
+      <p:transition p14:dur="350">
         <p:fade/>
       </p:transition>
     </mc:Choice>
     <mc:Fallback>
-      <p:transition spd="med">
+      <p:transition>
         <p:fade/>
       </p:transition>
     </mc:Fallback>
@@ -5508,7 +5755,7 @@
           <a:p>
             <a:r>
               <a:rPr lang="en-US" dirty="0" smtClean="0"/>
-              <a:t>Resources</a:t>
+              <a:t>Backup/Restore</a:t>
             </a:r>
             <a:endParaRPr lang="en-US" dirty="0"/>
           </a:p>
@@ -5524,127 +5771,59 @@
             <p:ph idx="1"/>
           </p:nvPr>
         </p:nvSpPr>
-        <p:spPr>
-          <a:xfrm>
-            <a:off x="457200" y="1600200"/>
-            <a:ext cx="7924800" cy="4800600"/>
-          </a:xfrm>
-        </p:spPr>
-        <p:txBody>
-          <a:bodyPr/>
-          <a:lstStyle/>
-          <a:p>
-            <a:r>
-              <a:rPr lang="en-US" dirty="0" smtClean="0"/>
-              <a:t>Documentation can be found </a:t>
-            </a:r>
-            <a:r>
-              <a:rPr lang="en-US" dirty="0"/>
-              <a:t>at </a:t>
-            </a:r>
-            <a:r>
-              <a:rPr lang="en-US" dirty="0">
-                <a:hlinkClick r:id="rId2"/>
-              </a:rPr>
-              <a:t>http://ravendb.net/docs</a:t>
-            </a:r>
-            <a:r>
-              <a:rPr lang="en-US" dirty="0" smtClean="0">
-                <a:hlinkClick r:id="rId2"/>
-              </a:rPr>
-              <a:t>/</a:t>
+        <p:spPr/>
+        <p:txBody>
+          <a:bodyPr/>
+          <a:lstStyle/>
+          <a:p>
+            <a:r>
+              <a:rPr lang="en-US" dirty="0" smtClean="0"/>
+              <a:t>IT is creating nightly and incremental backups using VSS</a:t>
+            </a:r>
+          </a:p>
+          <a:p>
+            <a:r>
+              <a:rPr lang="en-US" dirty="0" smtClean="0"/>
+              <a:t>We can also create backups through the studio or Raven.Backup.exe</a:t>
+            </a:r>
+          </a:p>
+          <a:p>
+            <a:r>
+              <a:rPr lang="en-US" dirty="0" smtClean="0"/>
+              <a:t>Restore is an offline operation</a:t>
+            </a:r>
+          </a:p>
+          <a:p>
+            <a:pPr lvl="1"/>
+            <a:r>
+              <a:rPr lang="en-US" dirty="0" smtClean="0"/>
+              <a:t>VSS backups are restored by copying the data back to the original location and starting </a:t>
+            </a:r>
+            <a:r>
+              <a:rPr lang="en-US" dirty="0" err="1" smtClean="0"/>
+              <a:t>RavenDB</a:t>
             </a:r>
             <a:endParaRPr lang="en-US" dirty="0" smtClean="0"/>
           </a:p>
           <a:p>
-            <a:r>
-              <a:rPr lang="en-US" dirty="0" smtClean="0"/>
-              <a:t>Mailing list</a:t>
-            </a:r>
-            <a:r>
-              <a:rPr lang="en-US" dirty="0"/>
-              <a:t>: </a:t>
-            </a:r>
-            <a:r>
-              <a:rPr lang="en-US" dirty="0">
-                <a:hlinkClick r:id="rId3"/>
-              </a:rPr>
-              <a:t>https://groups.google.com/forum/#!</a:t>
-            </a:r>
-            <a:r>
-              <a:rPr lang="en-US" dirty="0" smtClean="0">
-                <a:hlinkClick r:id="rId3"/>
-              </a:rPr>
-              <a:t>forum/ravendb</a:t>
-            </a:r>
-            <a:endParaRPr lang="en-US" dirty="0" smtClean="0"/>
-          </a:p>
-          <a:p>
-            <a:r>
-              <a:rPr lang="en-US" dirty="0" err="1" smtClean="0"/>
-              <a:t>GitHub</a:t>
-            </a:r>
-            <a:r>
-              <a:rPr lang="en-US" dirty="0"/>
-              <a:t>: </a:t>
-            </a:r>
-            <a:r>
-              <a:rPr lang="en-US" dirty="0">
-                <a:hlinkClick r:id="rId4"/>
-              </a:rPr>
-              <a:t>https://github.com/ravendb</a:t>
-            </a:r>
-            <a:r>
-              <a:rPr lang="en-US" dirty="0" smtClean="0">
-                <a:hlinkClick r:id="rId4"/>
-              </a:rPr>
-              <a:t>/</a:t>
-            </a:r>
-            <a:endParaRPr lang="en-US" dirty="0" smtClean="0"/>
-          </a:p>
-          <a:p>
-            <a:r>
-              <a:rPr lang="en-US" dirty="0" smtClean="0"/>
-              <a:t>Jeremy Miller on Reversibility: </a:t>
-            </a:r>
-          </a:p>
-          <a:p>
             <a:pPr lvl="1"/>
             <a:r>
-              <a:rPr lang="en-US" dirty="0">
-                <a:hlinkClick r:id="rId5"/>
-              </a:rPr>
-              <a:t>http://codebetter.com/jeremymiller/2008/02/11/first-causes-reversibility</a:t>
-            </a:r>
-            <a:r>
-              <a:rPr lang="en-US" dirty="0" smtClean="0">
-                <a:hlinkClick r:id="rId5"/>
-              </a:rPr>
-              <a:t>/</a:t>
-            </a:r>
-            <a:endParaRPr lang="en-US" dirty="0" smtClean="0"/>
+              <a:rPr lang="en-US" dirty="0" smtClean="0"/>
+              <a:t>Other backups can be restored through the studio or Raven.Backup.exe</a:t>
+            </a:r>
+          </a:p>
+          <a:p>
+            <a:r>
+              <a:rPr lang="en-US" dirty="0" smtClean="0"/>
+              <a:t>Import/Export can also come in handy</a:t>
+            </a:r>
           </a:p>
           <a:p>
             <a:pPr lvl="1"/>
             <a:r>
-              <a:rPr lang="en-US" dirty="0">
-                <a:hlinkClick r:id="rId6"/>
-              </a:rPr>
-              <a:t>http://jeremydmiller.com/2013/01/02/continuous-design-and-reversibility-at-agile-vancouver-video</a:t>
-            </a:r>
-            <a:r>
-              <a:rPr lang="en-US" dirty="0" smtClean="0">
-                <a:hlinkClick r:id="rId6"/>
-              </a:rPr>
-              <a:t>/</a:t>
-            </a:r>
-            <a:endParaRPr lang="en-US" dirty="0" smtClean="0"/>
-          </a:p>
-          <a:p>
-            <a:pPr lvl="1"/>
-            <a:endParaRPr lang="en-US" dirty="0" smtClean="0"/>
-          </a:p>
-          <a:p>
+              <a:rPr lang="en-US" dirty="0" smtClean="0"/>
+              <a:t>Can be done through the studio or by using Raven.Smuggler.exe</a:t>
+            </a:r>
             <a:endParaRPr lang="en-US" dirty="0"/>
           </a:p>
         </p:txBody>
@@ -5652,7 +5831,7 @@
     </p:spTree>
     <p:extLst>
       <p:ext uri="{BB962C8B-B14F-4D97-AF65-F5344CB8AC3E}">
-        <p14:creationId xmlns:p14="http://schemas.microsoft.com/office/powerpoint/2010/main" val="2591485194"/>
+        <p14:creationId xmlns:p14="http://schemas.microsoft.com/office/powerpoint/2010/main" val="2691524604"/>
       </p:ext>
     </p:extLst>
   </p:cSld>
@@ -5661,12 +5840,231 @@
   </p:clrMapOvr>
   <mc:AlternateContent xmlns:mc="http://schemas.openxmlformats.org/markup-compatibility/2006">
     <mc:Choice xmlns:p14="http://schemas.microsoft.com/office/powerpoint/2010/main" Requires="p14">
-      <p:transition spd="med" p14:dur="700">
+      <p:transition p14:dur="350">
         <p:fade/>
       </p:transition>
     </mc:Choice>
     <mc:Fallback>
-      <p:transition spd="med">
+      <p:transition>
+        <p:fade/>
+      </p:transition>
+    </mc:Fallback>
+  </mc:AlternateContent>
+  <p:timing>
+    <p:tnLst>
+      <p:par>
+        <p:cTn id="1" dur="indefinite" restart="never" nodeType="tmRoot"/>
+      </p:par>
+    </p:tnLst>
+  </p:timing>
+</p:sld>
+</file>
+
+<file path=ppt/slides/slide9.xml><?xml version="1.0" encoding="utf-8"?>
+<p:sld xmlns:a="http://schemas.openxmlformats.org/drawingml/2006/main" xmlns:r="http://schemas.openxmlformats.org/officeDocument/2006/relationships" xmlns:p="http://schemas.openxmlformats.org/presentationml/2006/main">
+  <p:cSld>
+    <p:spTree>
+      <p:nvGrpSpPr>
+        <p:cNvPr id="1" name=""/>
+        <p:cNvGrpSpPr/>
+        <p:nvPr/>
+      </p:nvGrpSpPr>
+      <p:grpSpPr>
+        <a:xfrm>
+          <a:off x="0" y="0"/>
+          <a:ext cx="0" cy="0"/>
+          <a:chOff x="0" y="0"/>
+          <a:chExt cx="0" cy="0"/>
+        </a:xfrm>
+      </p:grpSpPr>
+      <p:sp>
+        <p:nvSpPr>
+          <p:cNvPr id="2" name="Title 1"/>
+          <p:cNvSpPr>
+            <a:spLocks noGrp="1"/>
+          </p:cNvSpPr>
+          <p:nvPr>
+            <p:ph type="title"/>
+          </p:nvPr>
+        </p:nvSpPr>
+        <p:spPr/>
+        <p:txBody>
+          <a:bodyPr/>
+          <a:lstStyle/>
+          <a:p>
+            <a:r>
+              <a:rPr lang="en-US" dirty="0" smtClean="0"/>
+              <a:t>Final Thoughts</a:t>
+            </a:r>
+            <a:endParaRPr lang="en-US" dirty="0"/>
+          </a:p>
+        </p:txBody>
+      </p:sp>
+      <p:sp>
+        <p:nvSpPr>
+          <p:cNvPr id="3" name="Content Placeholder 2"/>
+          <p:cNvSpPr>
+            <a:spLocks noGrp="1"/>
+          </p:cNvSpPr>
+          <p:nvPr>
+            <p:ph idx="1"/>
+          </p:nvPr>
+        </p:nvSpPr>
+        <p:spPr>
+          <a:xfrm>
+            <a:off x="457200" y="1600200"/>
+            <a:ext cx="3352800" cy="4800600"/>
+          </a:xfrm>
+        </p:spPr>
+        <p:txBody>
+          <a:bodyPr/>
+          <a:lstStyle/>
+          <a:p>
+            <a:r>
+              <a:rPr lang="en-US" dirty="0" smtClean="0"/>
+              <a:t>Think!</a:t>
+            </a:r>
+          </a:p>
+          <a:p>
+            <a:pPr lvl="1"/>
+            <a:r>
+              <a:rPr lang="en-US" dirty="0" smtClean="0"/>
+              <a:t>About your data</a:t>
+            </a:r>
+          </a:p>
+          <a:p>
+            <a:pPr lvl="1"/>
+            <a:r>
+              <a:rPr lang="en-US" dirty="0"/>
+              <a:t>A</a:t>
+            </a:r>
+            <a:r>
+              <a:rPr lang="en-US" dirty="0" smtClean="0"/>
+              <a:t>nd how it’s accessed</a:t>
+            </a:r>
+          </a:p>
+          <a:p>
+            <a:pPr lvl="1"/>
+            <a:r>
+              <a:rPr lang="en-US" dirty="0"/>
+              <a:t>A</a:t>
+            </a:r>
+            <a:r>
+              <a:rPr lang="en-US" dirty="0" smtClean="0"/>
+              <a:t>nd how it’ll change</a:t>
+            </a:r>
+          </a:p>
+          <a:p>
+            <a:r>
+              <a:rPr lang="en-US" dirty="0" smtClean="0"/>
+              <a:t>RTFM</a:t>
+            </a:r>
+          </a:p>
+          <a:p>
+            <a:r>
+              <a:rPr lang="en-US" dirty="0" smtClean="0"/>
+              <a:t>Make </a:t>
+            </a:r>
+            <a:r>
+              <a:rPr lang="en-US" dirty="0" err="1" smtClean="0"/>
+              <a:t>RavenDB</a:t>
+            </a:r>
+            <a:r>
+              <a:rPr lang="en-US" dirty="0" smtClean="0"/>
+              <a:t> work for you, not against you</a:t>
+            </a:r>
+          </a:p>
+        </p:txBody>
+      </p:sp>
+      <p:pic>
+        <p:nvPicPr>
+          <p:cNvPr id="1026" name="Picture 2" descr="C:\Projects\Presentations\RavenDB\git\docs\rtfm.png"/>
+          <p:cNvPicPr>
+            <a:picLocks noChangeAspect="1" noChangeArrowheads="1"/>
+          </p:cNvPicPr>
+          <p:nvPr/>
+        </p:nvPicPr>
+        <p:blipFill>
+          <a:blip r:embed="rId2">
+            <a:extLst>
+              <a:ext uri="{28A0092B-C50C-407E-A947-70E740481C1C}">
+                <a14:useLocalDpi xmlns:a14="http://schemas.microsoft.com/office/drawing/2010/main" val="0"/>
+              </a:ext>
+            </a:extLst>
+          </a:blip>
+          <a:srcRect/>
+          <a:stretch>
+            <a:fillRect/>
+          </a:stretch>
+        </p:blipFill>
+        <p:spPr bwMode="auto">
+          <a:xfrm>
+            <a:off x="4013200" y="1346199"/>
+            <a:ext cx="4445000" cy="5511801"/>
+          </a:xfrm>
+          <a:prstGeom prst="rect">
+            <a:avLst/>
+          </a:prstGeom>
+          <a:noFill/>
+          <a:extLst>
+            <a:ext uri="{909E8E84-426E-40DD-AFC4-6F175D3DCCD1}">
+              <a14:hiddenFill xmlns:a14="http://schemas.microsoft.com/office/drawing/2010/main">
+                <a:solidFill>
+                  <a:srgbClr val="FFFFFF"/>
+                </a:solidFill>
+              </a14:hiddenFill>
+            </a:ext>
+          </a:extLst>
+        </p:spPr>
+      </p:pic>
+      <p:sp>
+        <p:nvSpPr>
+          <p:cNvPr id="4" name="TextBox 3"/>
+          <p:cNvSpPr txBox="1"/>
+          <p:nvPr/>
+        </p:nvSpPr>
+        <p:spPr>
+          <a:xfrm>
+            <a:off x="6324600" y="6513477"/>
+            <a:ext cx="2172005" cy="369332"/>
+          </a:xfrm>
+          <a:prstGeom prst="rect">
+            <a:avLst/>
+          </a:prstGeom>
+          <a:noFill/>
+        </p:spPr>
+        <p:txBody>
+          <a:bodyPr wrap="none" rtlCol="0">
+            <a:spAutoFit/>
+          </a:bodyPr>
+          <a:lstStyle/>
+          <a:p>
+            <a:r>
+              <a:rPr lang="en-US" cap="small" dirty="0"/>
+              <a:t>http://xkcd.com/293/</a:t>
+            </a:r>
+            <a:endParaRPr lang="en-US" dirty="0"/>
+          </a:p>
+        </p:txBody>
+      </p:sp>
+    </p:spTree>
+    <p:extLst>
+      <p:ext uri="{BB962C8B-B14F-4D97-AF65-F5344CB8AC3E}">
+        <p14:creationId xmlns:p14="http://schemas.microsoft.com/office/powerpoint/2010/main" val="1092538587"/>
+      </p:ext>
+    </p:extLst>
+  </p:cSld>
+  <p:clrMapOvr>
+    <a:masterClrMapping/>
+  </p:clrMapOvr>
+  <mc:AlternateContent xmlns:mc="http://schemas.openxmlformats.org/markup-compatibility/2006">
+    <mc:Choice xmlns:p14="http://schemas.microsoft.com/office/powerpoint/2010/main" Requires="p14">
+      <p:transition p14:dur="350">
+        <p:fade/>
+      </p:transition>
+    </mc:Choice>
+    <mc:Fallback>
+      <p:transition>
         <p:fade/>
       </p:transition>
     </mc:Fallback>

</xml_diff>

<commit_message>
Added a few more notes to the slides.
</commit_message>
<xml_diff>
--- a/docs/RavenDB.pptx
+++ b/docs/RavenDB.pptx
@@ -10,8 +10,8 @@
   <p:sldIdLst>
     <p:sldId id="256" r:id="rId2"/>
     <p:sldId id="257" r:id="rId3"/>
-    <p:sldId id="258" r:id="rId4"/>
-    <p:sldId id="264" r:id="rId5"/>
+    <p:sldId id="264" r:id="rId4"/>
+    <p:sldId id="258" r:id="rId5"/>
     <p:sldId id="259" r:id="rId6"/>
     <p:sldId id="260" r:id="rId7"/>
     <p:sldId id="263" r:id="rId8"/>
@@ -201,7 +201,7 @@
           <a:p>
             <a:fld id="{6CBD5C98-7F79-422E-BD07-32DA2D269530}" type="datetimeFigureOut">
               <a:rPr lang="en-US" smtClean="0"/>
-              <a:t>2/14/2014</a:t>
+              <a:t>2/19/2014</a:t>
             </a:fld>
             <a:endParaRPr lang="en-US"/>
           </a:p>
@@ -543,7 +543,7 @@
             </a:r>
             <a:r>
               <a:rPr lang="en-US" baseline="0" dirty="0" smtClean="0"/>
-              <a:t> as a data store, and haven’t taken advantage of many of the additional features it provides, so let me explain some of the reasons why we’ve gone that route up to this point.</a:t>
+              <a:t> as a data store, and haven’t taken advantage of some of the more advanced features it provides, so let me explain some of the reasons why we’ve gone that route up to this point.</a:t>
             </a:r>
             <a:endParaRPr lang="en-US" dirty="0" smtClean="0"/>
           </a:p>
@@ -784,71 +784,35 @@
           <a:p>
             <a:r>
               <a:rPr lang="en-US" dirty="0" smtClean="0"/>
-              <a:t>I find automatic</a:t>
+              <a:t>Can anyone tell me some different ways you can avoid hitting the session limit?</a:t>
+            </a:r>
+          </a:p>
+          <a:p>
+            <a:r>
+              <a:rPr lang="en-US" dirty="0" smtClean="0"/>
+              <a:t>-You</a:t>
             </a:r>
             <a:r>
               <a:rPr lang="en-US" baseline="0" dirty="0" smtClean="0"/>
-              <a:t> indexes to be a good starting point for most queries, but there a few caveats with them.  First, </a:t>
-            </a:r>
-            <a:r>
-              <a:rPr lang="en-US" baseline="0" dirty="0" err="1" smtClean="0"/>
-              <a:t>RavenDB</a:t>
-            </a:r>
+              <a:t> can pass multiple document ids to Load() to get all the documents in one trip to the server.</a:t>
+            </a:r>
+          </a:p>
+          <a:p>
             <a:r>
               <a:rPr lang="en-US" baseline="0" dirty="0" smtClean="0"/>
-              <a:t> can only generate indexes for simple queries, and we’ve seen a few cases where the auto-index of a moderately complex query returned the wrong data.  You’ll want to be sure to have tests for your queries.</a:t>
-            </a:r>
-          </a:p>
-          <a:p>
-            <a:endParaRPr lang="en-US" baseline="0" dirty="0" smtClean="0"/>
+              <a:t>-You can use the Include() method when querying to include a related document.  Then when Load that document, the session will already have it in memory.</a:t>
+            </a:r>
           </a:p>
           <a:p>
             <a:r>
               <a:rPr lang="en-US" baseline="0" dirty="0" smtClean="0"/>
-              <a:t>The traditional type of index in </a:t>
-            </a:r>
-            <a:r>
-              <a:rPr lang="en-US" baseline="0" dirty="0" err="1" smtClean="0"/>
-              <a:t>RavenDB</a:t>
-            </a:r>
-            <a:r>
-              <a:rPr lang="en-US" baseline="0" dirty="0" smtClean="0"/>
-              <a:t> is known as a static index.  The </a:t>
-            </a:r>
-            <a:r>
-              <a:rPr lang="en-US" baseline="0" dirty="0" err="1" smtClean="0"/>
-              <a:t>RavenDB</a:t>
-            </a:r>
-            <a:r>
-              <a:rPr lang="en-US" baseline="0" dirty="0" smtClean="0"/>
-              <a:t> documentation still says that static indexes are the recommended way to do most queries.  Static indexes can be created from the management studio or from your application.  The benefit of creating them within your application is that you get the usual compile-time checks and </a:t>
-            </a:r>
-            <a:r>
-              <a:rPr lang="en-US" baseline="0" dirty="0" err="1" smtClean="0"/>
-              <a:t>intellisense</a:t>
-            </a:r>
-            <a:r>
-              <a:rPr lang="en-US" baseline="0" dirty="0" smtClean="0"/>
-              <a:t>.</a:t>
-            </a:r>
-          </a:p>
-          <a:p>
-            <a:endParaRPr lang="en-US" baseline="0" dirty="0" smtClean="0"/>
-          </a:p>
-          <a:p>
-            <a:r>
-              <a:rPr lang="en-US" baseline="0" dirty="0" smtClean="0"/>
-              <a:t>If you need to modify an index in the management studio and haven’t yet deployed the update to the index definition in your application, you can lock the index in the studio so it won’t revert back when the application restarts.</a:t>
-            </a:r>
-          </a:p>
-          <a:p>
-            <a:endParaRPr lang="en-US" baseline="0" dirty="0" smtClean="0"/>
-          </a:p>
-          <a:p>
-            <a:r>
-              <a:rPr lang="en-US" baseline="0" dirty="0" smtClean="0"/>
-              <a:t>There are a lot of other things you can do with indexes that I won’t cover now, but they’re all covered in the online documentation.</a:t>
-            </a:r>
+              <a:t>-You can rethink your document design.  Perhaps the data should be grouped into </a:t>
+            </a:r>
+            <a:r>
+              <a:rPr lang="en-US" baseline="0" smtClean="0"/>
+              <a:t>one document.</a:t>
+            </a:r>
+            <a:endParaRPr lang="en-US" dirty="0"/>
           </a:p>
         </p:txBody>
       </p:sp>
@@ -869,7 +833,7 @@
           <a:p>
             <a:fld id="{9EA69067-E6A7-4411-95E7-7AC23FA09CA0}" type="slidenum">
               <a:rPr lang="en-US" smtClean="0"/>
-              <a:t>5</a:t>
+              <a:t>3</a:t>
             </a:fld>
             <a:endParaRPr lang="en-US"/>
           </a:p>
@@ -878,7 +842,7 @@
     </p:spTree>
     <p:extLst>
       <p:ext uri="{BB962C8B-B14F-4D97-AF65-F5344CB8AC3E}">
-        <p14:creationId xmlns:p14="http://schemas.microsoft.com/office/powerpoint/2010/main" val="2635129486"/>
+        <p14:creationId xmlns:p14="http://schemas.microsoft.com/office/powerpoint/2010/main" val="763767251"/>
       </p:ext>
     </p:extLst>
   </p:cSld>
@@ -934,25 +898,71 @@
           <a:p>
             <a:r>
               <a:rPr lang="en-US" dirty="0" smtClean="0"/>
-              <a:t>Can anyone tell me the difference</a:t>
+              <a:t>I find automatic</a:t>
             </a:r>
             <a:r>
               <a:rPr lang="en-US" baseline="0" dirty="0" smtClean="0"/>
-              <a:t> between scalability and high availability?</a:t>
-            </a:r>
-          </a:p>
-          <a:p>
+              <a:t> indexes to be a good starting point for most queries, but there a few caveats with them.  First, </a:t>
+            </a:r>
+            <a:r>
+              <a:rPr lang="en-US" baseline="0" dirty="0" err="1" smtClean="0"/>
+              <a:t>RavenDB</a:t>
+            </a:r>
             <a:r>
               <a:rPr lang="en-US" baseline="0" dirty="0" smtClean="0"/>
-              <a:t>Scalability – performance, the ability to handle the number of users of your system</a:t>
-            </a:r>
+              <a:t> can only generate indexes for simple queries, and we’ve seen a few cases where the auto-index of a moderately complex query returned the wrong data.  You’ll want to be sure to have tests for your queries.</a:t>
+            </a:r>
+          </a:p>
+          <a:p>
+            <a:endParaRPr lang="en-US" baseline="0" dirty="0" smtClean="0"/>
           </a:p>
           <a:p>
             <a:r>
               <a:rPr lang="en-US" baseline="0" dirty="0" smtClean="0"/>
-              <a:t>High Availability – uptime, the ability to continue operating when one or more servers go down</a:t>
-            </a:r>
-            <a:endParaRPr lang="en-US" dirty="0"/>
+              <a:t>The traditional type of index in </a:t>
+            </a:r>
+            <a:r>
+              <a:rPr lang="en-US" baseline="0" dirty="0" err="1" smtClean="0"/>
+              <a:t>RavenDB</a:t>
+            </a:r>
+            <a:r>
+              <a:rPr lang="en-US" baseline="0" dirty="0" smtClean="0"/>
+              <a:t> is known as a static index.  The </a:t>
+            </a:r>
+            <a:r>
+              <a:rPr lang="en-US" baseline="0" dirty="0" err="1" smtClean="0"/>
+              <a:t>RavenDB</a:t>
+            </a:r>
+            <a:r>
+              <a:rPr lang="en-US" baseline="0" dirty="0" smtClean="0"/>
+              <a:t> documentation still says that static indexes are the recommended way to do most queries.  Static indexes can be created from the management studio or from your application.  The benefit of creating them within your application is that you get the usual compile-time checks and </a:t>
+            </a:r>
+            <a:r>
+              <a:rPr lang="en-US" baseline="0" dirty="0" err="1" smtClean="0"/>
+              <a:t>intellisense</a:t>
+            </a:r>
+            <a:r>
+              <a:rPr lang="en-US" baseline="0" dirty="0" smtClean="0"/>
+              <a:t>.</a:t>
+            </a:r>
+          </a:p>
+          <a:p>
+            <a:endParaRPr lang="en-US" baseline="0" dirty="0" smtClean="0"/>
+          </a:p>
+          <a:p>
+            <a:r>
+              <a:rPr lang="en-US" baseline="0" dirty="0" smtClean="0"/>
+              <a:t>If you need to modify an index in the management studio and haven’t yet deployed the update to the index definition in your application, you can lock the index in the studio so it won’t revert back when the application restarts.</a:t>
+            </a:r>
+          </a:p>
+          <a:p>
+            <a:endParaRPr lang="en-US" baseline="0" dirty="0" smtClean="0"/>
+          </a:p>
+          <a:p>
+            <a:r>
+              <a:rPr lang="en-US" baseline="0" dirty="0" smtClean="0"/>
+              <a:t>There are a lot of other things you can do with indexes that I won’t cover now, but they’re all covered in the online documentation.</a:t>
+            </a:r>
           </a:p>
         </p:txBody>
       </p:sp>
@@ -973,7 +983,7 @@
           <a:p>
             <a:fld id="{9EA69067-E6A7-4411-95E7-7AC23FA09CA0}" type="slidenum">
               <a:rPr lang="en-US" smtClean="0"/>
-              <a:t>6</a:t>
+              <a:t>5</a:t>
             </a:fld>
             <a:endParaRPr lang="en-US"/>
           </a:p>
@@ -982,7 +992,7 @@
     </p:spTree>
     <p:extLst>
       <p:ext uri="{BB962C8B-B14F-4D97-AF65-F5344CB8AC3E}">
-        <p14:creationId xmlns:p14="http://schemas.microsoft.com/office/powerpoint/2010/main" val="503015712"/>
+        <p14:creationId xmlns:p14="http://schemas.microsoft.com/office/powerpoint/2010/main" val="2635129486"/>
       </p:ext>
     </p:extLst>
   </p:cSld>
@@ -1038,6 +1048,110 @@
           <a:p>
             <a:r>
               <a:rPr lang="en-US" dirty="0" smtClean="0"/>
+              <a:t>Can anyone tell me the difference</a:t>
+            </a:r>
+            <a:r>
+              <a:rPr lang="en-US" baseline="0" dirty="0" smtClean="0"/>
+              <a:t> between scalability and high availability?</a:t>
+            </a:r>
+          </a:p>
+          <a:p>
+            <a:r>
+              <a:rPr lang="en-US" baseline="0" dirty="0" smtClean="0"/>
+              <a:t>Scalability – performance, the ability to handle the number of users of your system</a:t>
+            </a:r>
+          </a:p>
+          <a:p>
+            <a:r>
+              <a:rPr lang="en-US" baseline="0" dirty="0" smtClean="0"/>
+              <a:t>High Availability – uptime, the ability to continue operating when one or more servers go down</a:t>
+            </a:r>
+            <a:endParaRPr lang="en-US" dirty="0"/>
+          </a:p>
+        </p:txBody>
+      </p:sp>
+      <p:sp>
+        <p:nvSpPr>
+          <p:cNvPr id="4" name="Slide Number Placeholder 3"/>
+          <p:cNvSpPr>
+            <a:spLocks noGrp="1"/>
+          </p:cNvSpPr>
+          <p:nvPr>
+            <p:ph type="sldNum" sz="quarter" idx="10"/>
+          </p:nvPr>
+        </p:nvSpPr>
+        <p:spPr/>
+        <p:txBody>
+          <a:bodyPr/>
+          <a:lstStyle/>
+          <a:p>
+            <a:fld id="{9EA69067-E6A7-4411-95E7-7AC23FA09CA0}" type="slidenum">
+              <a:rPr lang="en-US" smtClean="0"/>
+              <a:t>6</a:t>
+            </a:fld>
+            <a:endParaRPr lang="en-US"/>
+          </a:p>
+        </p:txBody>
+      </p:sp>
+    </p:spTree>
+    <p:extLst>
+      <p:ext uri="{BB962C8B-B14F-4D97-AF65-F5344CB8AC3E}">
+        <p14:creationId xmlns:p14="http://schemas.microsoft.com/office/powerpoint/2010/main" val="503015712"/>
+      </p:ext>
+    </p:extLst>
+  </p:cSld>
+  <p:clrMapOvr>
+    <a:masterClrMapping/>
+  </p:clrMapOvr>
+</p:notes>
+</file>
+
+<file path=ppt/notesSlides/notesSlide6.xml><?xml version="1.0" encoding="utf-8"?>
+<p:notes xmlns:a="http://schemas.openxmlformats.org/drawingml/2006/main" xmlns:r="http://schemas.openxmlformats.org/officeDocument/2006/relationships" xmlns:p="http://schemas.openxmlformats.org/presentationml/2006/main">
+  <p:cSld>
+    <p:spTree>
+      <p:nvGrpSpPr>
+        <p:cNvPr id="1" name=""/>
+        <p:cNvGrpSpPr/>
+        <p:nvPr/>
+      </p:nvGrpSpPr>
+      <p:grpSpPr>
+        <a:xfrm>
+          <a:off x="0" y="0"/>
+          <a:ext cx="0" cy="0"/>
+          <a:chOff x="0" y="0"/>
+          <a:chExt cx="0" cy="0"/>
+        </a:xfrm>
+      </p:grpSpPr>
+      <p:sp>
+        <p:nvSpPr>
+          <p:cNvPr id="2" name="Slide Image Placeholder 1"/>
+          <p:cNvSpPr>
+            <a:spLocks noGrp="1" noRot="1" noChangeAspect="1"/>
+          </p:cNvSpPr>
+          <p:nvPr>
+            <p:ph type="sldImg"/>
+          </p:nvPr>
+        </p:nvSpPr>
+        <p:spPr/>
+      </p:sp>
+      <p:sp>
+        <p:nvSpPr>
+          <p:cNvPr id="3" name="Notes Placeholder 2"/>
+          <p:cNvSpPr>
+            <a:spLocks noGrp="1"/>
+          </p:cNvSpPr>
+          <p:nvPr>
+            <p:ph type="body" idx="1"/>
+          </p:nvPr>
+        </p:nvSpPr>
+        <p:spPr/>
+        <p:txBody>
+          <a:bodyPr/>
+          <a:lstStyle/>
+          <a:p>
+            <a:r>
+              <a:rPr lang="en-US" dirty="0" smtClean="0"/>
               <a:t>When using replication,</a:t>
             </a:r>
             <a:r>
@@ -1180,7 +1294,7 @@
 </p:notes>
 </file>
 
-<file path=ppt/notesSlides/notesSlide6.xml><?xml version="1.0" encoding="utf-8"?>
+<file path=ppt/notesSlides/notesSlide7.xml><?xml version="1.0" encoding="utf-8"?>
 <p:notes xmlns:a="http://schemas.openxmlformats.org/drawingml/2006/main" xmlns:r="http://schemas.openxmlformats.org/officeDocument/2006/relationships" xmlns:p="http://schemas.openxmlformats.org/presentationml/2006/main">
   <p:cSld>
     <p:spTree>
@@ -1459,7 +1573,7 @@
             <a:fld id="{1D8BD707-D9CF-40AE-B4C6-C98DA3205C09}" type="datetimeFigureOut">
               <a:rPr lang="en-US" smtClean="0"/>
               <a:pPr/>
-              <a:t>2/14/2014</a:t>
+              <a:t>2/19/2014</a:t>
             </a:fld>
             <a:endParaRPr lang="en-US"/>
           </a:p>
@@ -1626,7 +1740,7 @@
             <a:fld id="{1D8BD707-D9CF-40AE-B4C6-C98DA3205C09}" type="datetimeFigureOut">
               <a:rPr lang="en-US" smtClean="0"/>
               <a:pPr/>
-              <a:t>2/14/2014</a:t>
+              <a:t>2/19/2014</a:t>
             </a:fld>
             <a:endParaRPr lang="en-US"/>
           </a:p>
@@ -1803,7 +1917,7 @@
             <a:fld id="{1D8BD707-D9CF-40AE-B4C6-C98DA3205C09}" type="datetimeFigureOut">
               <a:rPr lang="en-US" smtClean="0"/>
               <a:pPr/>
-              <a:t>2/14/2014</a:t>
+              <a:t>2/19/2014</a:t>
             </a:fld>
             <a:endParaRPr lang="en-US"/>
           </a:p>
@@ -1970,7 +2084,7 @@
             <a:fld id="{1D8BD707-D9CF-40AE-B4C6-C98DA3205C09}" type="datetimeFigureOut">
               <a:rPr lang="en-US" smtClean="0"/>
               <a:pPr/>
-              <a:t>2/14/2014</a:t>
+              <a:t>2/19/2014</a:t>
             </a:fld>
             <a:endParaRPr lang="en-US"/>
           </a:p>
@@ -2213,7 +2327,7 @@
             <a:fld id="{1D8BD707-D9CF-40AE-B4C6-C98DA3205C09}" type="datetimeFigureOut">
               <a:rPr lang="en-US" smtClean="0"/>
               <a:pPr/>
-              <a:t>2/14/2014</a:t>
+              <a:t>2/19/2014</a:t>
             </a:fld>
             <a:endParaRPr lang="en-US"/>
           </a:p>
@@ -2498,7 +2612,7 @@
             <a:fld id="{1D8BD707-D9CF-40AE-B4C6-C98DA3205C09}" type="datetimeFigureOut">
               <a:rPr lang="en-US" smtClean="0"/>
               <a:pPr/>
-              <a:t>2/14/2014</a:t>
+              <a:t>2/19/2014</a:t>
             </a:fld>
             <a:endParaRPr lang="en-US"/>
           </a:p>
@@ -2929,7 +3043,7 @@
             <a:fld id="{1D8BD707-D9CF-40AE-B4C6-C98DA3205C09}" type="datetimeFigureOut">
               <a:rPr lang="en-US" smtClean="0"/>
               <a:pPr/>
-              <a:t>2/14/2014</a:t>
+              <a:t>2/19/2014</a:t>
             </a:fld>
             <a:endParaRPr lang="en-US"/>
           </a:p>
@@ -3044,7 +3158,7 @@
             <a:fld id="{1D8BD707-D9CF-40AE-B4C6-C98DA3205C09}" type="datetimeFigureOut">
               <a:rPr lang="en-US" smtClean="0"/>
               <a:pPr/>
-              <a:t>2/14/2014</a:t>
+              <a:t>2/19/2014</a:t>
             </a:fld>
             <a:endParaRPr lang="en-US"/>
           </a:p>
@@ -3136,7 +3250,7 @@
             <a:fld id="{1D8BD707-D9CF-40AE-B4C6-C98DA3205C09}" type="datetimeFigureOut">
               <a:rPr lang="en-US" smtClean="0"/>
               <a:pPr/>
-              <a:t>2/14/2014</a:t>
+              <a:t>2/19/2014</a:t>
             </a:fld>
             <a:endParaRPr lang="en-US"/>
           </a:p>
@@ -3327,7 +3441,7 @@
             <a:fld id="{1D8BD707-D9CF-40AE-B4C6-C98DA3205C09}" type="datetimeFigureOut">
               <a:rPr lang="en-US" smtClean="0"/>
               <a:pPr/>
-              <a:t>2/14/2014</a:t>
+              <a:t>2/19/2014</a:t>
             </a:fld>
             <a:endParaRPr lang="en-US"/>
           </a:p>
@@ -3647,7 +3761,7 @@
             <a:fld id="{1D8BD707-D9CF-40AE-B4C6-C98DA3205C09}" type="datetimeFigureOut">
               <a:rPr lang="en-US" smtClean="0"/>
               <a:pPr/>
-              <a:t>2/14/2014</a:t>
+              <a:t>2/19/2014</a:t>
             </a:fld>
             <a:endParaRPr lang="en-US"/>
           </a:p>
@@ -4029,7 +4143,7 @@
             <a:fld id="{1D8BD707-D9CF-40AE-B4C6-C98DA3205C09}" type="datetimeFigureOut">
               <a:rPr lang="en-US" smtClean="0"/>
               <a:pPr/>
-              <a:t>2/14/2014</a:t>
+              <a:t>2/19/2014</a:t>
             </a:fld>
             <a:endParaRPr lang="en-US"/>
           </a:p>
@@ -4404,36 +4518,6 @@
           </a:p>
         </p:txBody>
       </p:sp>
-      <p:pic>
-        <p:nvPicPr>
-          <p:cNvPr id="5" name="Picture 4"/>
-          <p:cNvPicPr>
-            <a:picLocks noChangeAspect="1"/>
-          </p:cNvPicPr>
-          <p:nvPr/>
-        </p:nvPicPr>
-        <p:blipFill>
-          <a:blip r:embed="rId3">
-            <a:extLst>
-              <a:ext uri="{28A0092B-C50C-407E-A947-70E740481C1C}">
-                <a14:useLocalDpi xmlns:a14="http://schemas.microsoft.com/office/drawing/2010/main" val="0"/>
-              </a:ext>
-            </a:extLst>
-          </a:blip>
-          <a:stretch>
-            <a:fillRect/>
-          </a:stretch>
-        </p:blipFill>
-        <p:spPr>
-          <a:xfrm>
-            <a:off x="4953000" y="5486400"/>
-            <a:ext cx="3429000" cy="1190625"/>
-          </a:xfrm>
-          <a:prstGeom prst="rect">
-            <a:avLst/>
-          </a:prstGeom>
-        </p:spPr>
-      </p:pic>
     </p:spTree>
     <p:extLst>
       <p:ext uri="{BB962C8B-B14F-4D97-AF65-F5344CB8AC3E}">
@@ -4444,13 +4528,13 @@
   <p:clrMapOvr>
     <a:masterClrMapping/>
   </p:clrMapOvr>
-  <mc:AlternateContent xmlns:mc="http://schemas.openxmlformats.org/markup-compatibility/2006">
-    <mc:Choice xmlns:p14="http://schemas.microsoft.com/office/powerpoint/2010/main" Requires="p14">
+  <mc:AlternateContent xmlns:mc="http://schemas.openxmlformats.org/markup-compatibility/2006" xmlns:p14="http://schemas.microsoft.com/office/powerpoint/2010/main">
+    <mc:Choice Requires="p14">
       <p:transition p14:dur="350">
         <p:fade/>
       </p:transition>
     </mc:Choice>
-    <mc:Fallback>
+    <mc:Fallback xmlns="">
       <p:transition>
         <p:fade/>
       </p:transition>
@@ -4651,13 +4735,13 @@
   <p:clrMapOvr>
     <a:masterClrMapping/>
   </p:clrMapOvr>
-  <mc:AlternateContent xmlns:mc="http://schemas.openxmlformats.org/markup-compatibility/2006">
-    <mc:Choice xmlns:p14="http://schemas.microsoft.com/office/powerpoint/2010/main" Requires="p14">
+  <mc:AlternateContent xmlns:mc="http://schemas.openxmlformats.org/markup-compatibility/2006" xmlns:p14="http://schemas.microsoft.com/office/powerpoint/2010/main">
+    <mc:Choice Requires="p14">
       <p:transition p14:dur="350">
         <p:fade/>
       </p:transition>
     </mc:Choice>
-    <mc:Fallback>
+    <mc:Fallback xmlns="">
       <p:transition>
         <p:fade/>
       </p:transition>
@@ -4801,8 +4885,9 @@
             <a:pPr lvl="1"/>
             <a:r>
               <a:rPr lang="en-US" dirty="0" smtClean="0"/>
-              <a:t>Can only make use of the basic features</a:t>
-            </a:r>
+              <a:t>Might have to forego using some features</a:t>
+            </a:r>
+            <a:endParaRPr lang="en-US" dirty="0" smtClean="0"/>
           </a:p>
           <a:p>
             <a:pPr lvl="1"/>
@@ -4833,13 +4918,13 @@
   <p:clrMapOvr>
     <a:masterClrMapping/>
   </p:clrMapOvr>
-  <mc:AlternateContent xmlns:mc="http://schemas.openxmlformats.org/markup-compatibility/2006">
-    <mc:Choice xmlns:p14="http://schemas.microsoft.com/office/powerpoint/2010/main" Requires="p14">
+  <mc:AlternateContent xmlns:mc="http://schemas.openxmlformats.org/markup-compatibility/2006" xmlns:p14="http://schemas.microsoft.com/office/powerpoint/2010/main">
+    <mc:Choice Requires="p14">
       <p:transition p14:dur="350">
         <p:fade/>
       </p:transition>
     </mc:Choice>
-    <mc:Fallback>
+    <mc:Fallback xmlns="">
       <p:transition>
         <p:fade/>
       </p:transition>
@@ -4889,7 +4974,7 @@
           <a:p>
             <a:r>
               <a:rPr lang="en-US" dirty="0" smtClean="0"/>
-              <a:t>It Just Works (mostly)</a:t>
+              <a:t>Safe by Default</a:t>
             </a:r>
             <a:endParaRPr lang="en-US" dirty="0"/>
           </a:p>
@@ -4905,119 +4990,129 @@
             <p:ph idx="1"/>
           </p:nvPr>
         </p:nvSpPr>
-        <p:spPr/>
-        <p:txBody>
-          <a:bodyPr/>
-          <a:lstStyle/>
-          <a:p>
+        <p:spPr>
+          <a:xfrm>
+            <a:off x="457200" y="1600200"/>
+            <a:ext cx="7924800" cy="4800600"/>
+          </a:xfrm>
+        </p:spPr>
+        <p:txBody>
+          <a:bodyPr/>
+          <a:lstStyle/>
+          <a:p>
+            <a:r>
+              <a:rPr lang="en-US" dirty="0" smtClean="0"/>
+              <a:t>Unbounded queries return the first </a:t>
+            </a:r>
+            <a:r>
+              <a:rPr lang="en-US" b="1" dirty="0" smtClean="0"/>
+              <a:t>128</a:t>
+            </a:r>
+            <a:r>
+              <a:rPr lang="en-US" dirty="0" smtClean="0"/>
+              <a:t> results</a:t>
+            </a:r>
+          </a:p>
+          <a:p>
+            <a:pPr lvl="1"/>
+            <a:r>
+              <a:rPr lang="en-US" dirty="0" smtClean="0"/>
+              <a:t>Use Take() to adjust this, up to a maximum of </a:t>
+            </a:r>
+            <a:r>
+              <a:rPr lang="en-US" b="1" dirty="0" smtClean="0"/>
+              <a:t>1024</a:t>
+            </a:r>
+            <a:r>
+              <a:rPr lang="en-US" dirty="0" smtClean="0"/>
+              <a:t> results</a:t>
+            </a:r>
+          </a:p>
+          <a:p>
+            <a:pPr lvl="1"/>
+            <a:r>
+              <a:rPr lang="en-US" dirty="0" smtClean="0"/>
+              <a:t>Use </a:t>
+            </a:r>
             <a:r>
               <a:rPr lang="en-US" dirty="0" err="1" smtClean="0"/>
-              <a:t>RavenDB</a:t>
-            </a:r>
-            <a:r>
-              <a:rPr lang="en-US" dirty="0" smtClean="0"/>
-              <a:t> is </a:t>
+              <a:t>session.Advanced.Stream</a:t>
+            </a:r>
+            <a:r>
+              <a:rPr lang="en-US" dirty="0" smtClean="0"/>
+              <a:t>() if you really need it</a:t>
+            </a:r>
+          </a:p>
+          <a:p>
+            <a:r>
+              <a:rPr lang="en-US" dirty="0" smtClean="0"/>
+              <a:t>A session has a default limit of </a:t>
             </a:r>
             <a:r>
               <a:rPr lang="en-US" b="1" dirty="0" smtClean="0"/>
-              <a:t>asynchronous</a:t>
-            </a:r>
-          </a:p>
-          <a:p>
-            <a:pPr lvl="1"/>
-            <a:r>
-              <a:rPr lang="en-US" dirty="0" smtClean="0"/>
-              <a:t>Load() will always return the latest version</a:t>
-            </a:r>
-          </a:p>
-          <a:p>
-            <a:pPr lvl="1"/>
-            <a:r>
-              <a:rPr lang="en-US" dirty="0" smtClean="0"/>
-              <a:t>Query() can be stale</a:t>
-            </a:r>
-          </a:p>
-          <a:p>
+              <a:t>30</a:t>
+            </a:r>
+            <a:r>
+              <a:rPr lang="en-US" dirty="0" smtClean="0"/>
+              <a:t> remote calls</a:t>
+            </a:r>
+          </a:p>
+          <a:p>
+            <a:r>
+              <a:rPr lang="en-US" dirty="0" smtClean="0"/>
+              <a:t>A session can override this limit by setting </a:t>
+            </a:r>
             <a:r>
               <a:rPr lang="en-US" dirty="0" err="1" smtClean="0"/>
-              <a:t>WaitForNonStaleResults</a:t>
-            </a:r>
-            <a:r>
-              <a:rPr lang="en-US" dirty="0" smtClean="0"/>
-              <a:t>()</a:t>
-            </a:r>
-          </a:p>
-          <a:p>
-            <a:pPr lvl="1"/>
-            <a:r>
-              <a:rPr lang="en-US" dirty="0" smtClean="0"/>
-              <a:t>Only use in tests</a:t>
-            </a:r>
-          </a:p>
-          <a:p>
+              <a:t>IDocumentSession.Advanced.MaxNumberOfRequestsPerSession</a:t>
+            </a:r>
+            <a:endParaRPr lang="en-US" dirty="0" smtClean="0"/>
+          </a:p>
+          <a:p>
+            <a:r>
+              <a:rPr lang="en-US" dirty="0" smtClean="0"/>
+              <a:t>Or </a:t>
+            </a:r>
+            <a:r>
+              <a:rPr lang="en-US" dirty="0" smtClean="0"/>
+              <a:t>application-wide </a:t>
+            </a:r>
+            <a:r>
+              <a:rPr lang="en-US" dirty="0" smtClean="0"/>
+              <a:t>through </a:t>
+            </a:r>
             <a:r>
               <a:rPr lang="en-US" dirty="0" err="1" smtClean="0"/>
-              <a:t>WaitForNonStaleResultsAsOfLastWrite</a:t>
-            </a:r>
-            <a:r>
-              <a:rPr lang="en-US" dirty="0" smtClean="0"/>
-              <a:t>()</a:t>
-            </a:r>
-          </a:p>
-          <a:p>
-            <a:pPr lvl="1"/>
-            <a:r>
-              <a:rPr lang="en-US" dirty="0" smtClean="0"/>
-              <a:t>Waits for the index to include the last write made by the current document store</a:t>
-            </a:r>
-          </a:p>
-          <a:p>
-            <a:pPr lvl="1"/>
-            <a:r>
-              <a:rPr lang="en-US" dirty="0" smtClean="0"/>
-              <a:t>Map/Reduce indexes may still be stale</a:t>
+              <a:t>IDocumentStore.Conventions.MaxNumberOfRequestsPerSession</a:t>
+            </a:r>
+            <a:endParaRPr lang="en-US" dirty="0" smtClean="0"/>
+          </a:p>
+          <a:p>
+            <a:r>
+              <a:rPr lang="en-US" dirty="0" smtClean="0"/>
+              <a:t>If you find yourself hitting this limit, you probably need to rethink your approach</a:t>
             </a:r>
             <a:endParaRPr lang="en-US" dirty="0"/>
-          </a:p>
-          <a:p>
-            <a:r>
-              <a:rPr lang="en-US" dirty="0" err="1" smtClean="0"/>
-              <a:t>WaitForNonStaleResultsAsOfNow</a:t>
-            </a:r>
-            <a:r>
-              <a:rPr lang="en-US" dirty="0" smtClean="0"/>
-              <a:t>()</a:t>
-            </a:r>
-          </a:p>
-          <a:p>
-            <a:r>
-              <a:rPr lang="en-US" dirty="0" err="1" smtClean="0"/>
-              <a:t>WaitForNonStaleResultsAsOf</a:t>
-            </a:r>
-            <a:r>
-              <a:rPr lang="en-US" dirty="0" smtClean="0"/>
-              <a:t>(cutoff)</a:t>
-            </a:r>
           </a:p>
         </p:txBody>
       </p:sp>
     </p:spTree>
     <p:extLst>
       <p:ext uri="{BB962C8B-B14F-4D97-AF65-F5344CB8AC3E}">
-        <p14:creationId xmlns:p14="http://schemas.microsoft.com/office/powerpoint/2010/main" val="3385066756"/>
+        <p14:creationId xmlns:p14="http://schemas.microsoft.com/office/powerpoint/2010/main" val="610810724"/>
       </p:ext>
     </p:extLst>
   </p:cSld>
   <p:clrMapOvr>
     <a:masterClrMapping/>
   </p:clrMapOvr>
-  <mc:AlternateContent xmlns:mc="http://schemas.openxmlformats.org/markup-compatibility/2006">
-    <mc:Choice xmlns:p14="http://schemas.microsoft.com/office/powerpoint/2010/main" Requires="p14">
+  <mc:AlternateContent xmlns:mc="http://schemas.openxmlformats.org/markup-compatibility/2006" xmlns:p14="http://schemas.microsoft.com/office/powerpoint/2010/main">
+    <mc:Choice Requires="p14">
       <p:transition p14:dur="350">
         <p:fade/>
       </p:transition>
     </mc:Choice>
-    <mc:Fallback>
+    <mc:Fallback xmlns="">
       <p:transition>
         <p:fade/>
       </p:transition>
@@ -5067,7 +5162,7 @@
           <a:p>
             <a:r>
               <a:rPr lang="en-US" dirty="0" smtClean="0"/>
-              <a:t>Safe by Default</a:t>
+              <a:t>It Just Works (mostly)</a:t>
             </a:r>
             <a:endParaRPr lang="en-US" dirty="0"/>
           </a:p>
@@ -5083,121 +5178,127 @@
             <p:ph idx="1"/>
           </p:nvPr>
         </p:nvSpPr>
-        <p:spPr>
-          <a:xfrm>
-            <a:off x="457200" y="1600200"/>
-            <a:ext cx="7924800" cy="4800600"/>
-          </a:xfrm>
-        </p:spPr>
-        <p:txBody>
-          <a:bodyPr/>
-          <a:lstStyle/>
-          <a:p>
-            <a:r>
-              <a:rPr lang="en-US" dirty="0" smtClean="0"/>
-              <a:t>Unbounded queries return the first </a:t>
+        <p:spPr/>
+        <p:txBody>
+          <a:bodyPr/>
+          <a:lstStyle/>
+          <a:p>
+            <a:r>
+              <a:rPr lang="en-US" dirty="0" err="1" smtClean="0"/>
+              <a:t>RavenDB</a:t>
+            </a:r>
+            <a:r>
+              <a:rPr lang="en-US" dirty="0" smtClean="0"/>
+              <a:t> is </a:t>
             </a:r>
             <a:r>
               <a:rPr lang="en-US" b="1" dirty="0" smtClean="0"/>
-              <a:t>128</a:t>
-            </a:r>
-            <a:r>
-              <a:rPr lang="en-US" dirty="0" smtClean="0"/>
-              <a:t> results</a:t>
+              <a:t>asynchronous</a:t>
             </a:r>
           </a:p>
           <a:p>
             <a:pPr lvl="1"/>
             <a:r>
               <a:rPr lang="en-US" dirty="0" smtClean="0"/>
-              <a:t>Use Take() to adjust this, up to a maximum of </a:t>
-            </a:r>
-            <a:r>
-              <a:rPr lang="en-US" b="1" dirty="0" smtClean="0"/>
-              <a:t>1024</a:t>
-            </a:r>
-            <a:r>
-              <a:rPr lang="en-US" dirty="0" smtClean="0"/>
-              <a:t> results</a:t>
+              <a:t>Load() will </a:t>
+            </a:r>
+            <a:r>
+              <a:rPr lang="en-US" dirty="0" smtClean="0"/>
+              <a:t>return </a:t>
+            </a:r>
+            <a:r>
+              <a:rPr lang="en-US" dirty="0" smtClean="0"/>
+              <a:t>the latest version</a:t>
             </a:r>
           </a:p>
           <a:p>
             <a:pPr lvl="1"/>
             <a:r>
               <a:rPr lang="en-US" dirty="0" smtClean="0"/>
-              <a:t>Use </a:t>
-            </a:r>
+              <a:t>Query() can be stale</a:t>
+            </a:r>
+          </a:p>
+          <a:p>
             <a:r>
               <a:rPr lang="en-US" dirty="0" err="1" smtClean="0"/>
-              <a:t>session.Advanced.Stream</a:t>
-            </a:r>
-            <a:r>
-              <a:rPr lang="en-US" dirty="0" smtClean="0"/>
-              <a:t>() if you really need it</a:t>
-            </a:r>
-          </a:p>
-          <a:p>
-            <a:r>
-              <a:rPr lang="en-US" dirty="0" smtClean="0"/>
-              <a:t>A session has a default limit of </a:t>
-            </a:r>
-            <a:r>
-              <a:rPr lang="en-US" b="1" dirty="0" smtClean="0"/>
-              <a:t>30</a:t>
-            </a:r>
-            <a:r>
-              <a:rPr lang="en-US" dirty="0" smtClean="0"/>
-              <a:t> remote calls</a:t>
-            </a:r>
-          </a:p>
-          <a:p>
-            <a:r>
-              <a:rPr lang="en-US" dirty="0" smtClean="0"/>
-              <a:t>A session can override this limit by setting </a:t>
-            </a:r>
+              <a:t>WaitForNonStaleResults</a:t>
+            </a:r>
+            <a:r>
+              <a:rPr lang="en-US" dirty="0" smtClean="0"/>
+              <a:t>()</a:t>
+            </a:r>
+          </a:p>
+          <a:p>
+            <a:pPr lvl="1"/>
+            <a:r>
+              <a:rPr lang="en-US" dirty="0" smtClean="0"/>
+              <a:t>Only use in tests</a:t>
+            </a:r>
+          </a:p>
+          <a:p>
             <a:r>
               <a:rPr lang="en-US" dirty="0" err="1" smtClean="0"/>
-              <a:t>IDocumentSession.Advanced.MaxNumberOfRequestsPerSession</a:t>
-            </a:r>
-            <a:endParaRPr lang="en-US" dirty="0" smtClean="0"/>
-          </a:p>
-          <a:p>
-            <a:r>
-              <a:rPr lang="en-US" dirty="0" smtClean="0"/>
-              <a:t>Or application wide through </a:t>
-            </a:r>
+              <a:t>WaitForNonStaleResultsAsOfLastWrite</a:t>
+            </a:r>
+            <a:r>
+              <a:rPr lang="en-US" dirty="0" smtClean="0"/>
+              <a:t>()</a:t>
+            </a:r>
+          </a:p>
+          <a:p>
+            <a:pPr lvl="1"/>
+            <a:r>
+              <a:rPr lang="en-US" dirty="0" smtClean="0"/>
+              <a:t>Waits for the index to include the last write made by the current document store</a:t>
+            </a:r>
+          </a:p>
+          <a:p>
+            <a:pPr lvl="1"/>
+            <a:r>
+              <a:rPr lang="en-US" dirty="0" smtClean="0"/>
+              <a:t>Map/Reduce indexes may still be stale</a:t>
+            </a:r>
+            <a:endParaRPr lang="en-US" dirty="0"/>
+          </a:p>
+          <a:p>
             <a:r>
               <a:rPr lang="en-US" dirty="0" err="1" smtClean="0"/>
-              <a:t>IDocumentStore.Conventions.MaxNumberOfRequestsPerSession</a:t>
-            </a:r>
-            <a:endParaRPr lang="en-US" dirty="0" smtClean="0"/>
-          </a:p>
-          <a:p>
-            <a:r>
-              <a:rPr lang="en-US" dirty="0" smtClean="0"/>
-              <a:t>If you find yourself hitting this limit, you probably need to rethink your approach</a:t>
-            </a:r>
-            <a:endParaRPr lang="en-US" dirty="0"/>
+              <a:t>WaitForNonStaleResultsAsOfNow</a:t>
+            </a:r>
+            <a:r>
+              <a:rPr lang="en-US" dirty="0" smtClean="0"/>
+              <a:t>()</a:t>
+            </a:r>
+          </a:p>
+          <a:p>
+            <a:r>
+              <a:rPr lang="en-US" dirty="0" err="1" smtClean="0"/>
+              <a:t>WaitForNonStaleResultsAsOf</a:t>
+            </a:r>
+            <a:r>
+              <a:rPr lang="en-US" dirty="0" smtClean="0"/>
+              <a:t>(cutoff)</a:t>
+            </a:r>
           </a:p>
         </p:txBody>
       </p:sp>
     </p:spTree>
     <p:extLst>
       <p:ext uri="{BB962C8B-B14F-4D97-AF65-F5344CB8AC3E}">
-        <p14:creationId xmlns:p14="http://schemas.microsoft.com/office/powerpoint/2010/main" val="610810724"/>
+        <p14:creationId xmlns:p14="http://schemas.microsoft.com/office/powerpoint/2010/main" val="3385066756"/>
       </p:ext>
     </p:extLst>
   </p:cSld>
   <p:clrMapOvr>
     <a:masterClrMapping/>
   </p:clrMapOvr>
-  <mc:AlternateContent xmlns:mc="http://schemas.openxmlformats.org/markup-compatibility/2006">
-    <mc:Choice xmlns:p14="http://schemas.microsoft.com/office/powerpoint/2010/main" Requires="p14">
+  <mc:AlternateContent xmlns:mc="http://schemas.openxmlformats.org/markup-compatibility/2006" xmlns:p14="http://schemas.microsoft.com/office/powerpoint/2010/main">
+    <mc:Choice Requires="p14">
       <p:transition p14:dur="350">
         <p:fade/>
       </p:transition>
     </mc:Choice>
-    <mc:Fallback>
+    <mc:Fallback xmlns="">
       <p:transition>
         <p:fade/>
       </p:transition>
@@ -5373,13 +5474,13 @@
   <p:clrMapOvr>
     <a:masterClrMapping/>
   </p:clrMapOvr>
-  <mc:AlternateContent xmlns:mc="http://schemas.openxmlformats.org/markup-compatibility/2006">
-    <mc:Choice xmlns:p14="http://schemas.microsoft.com/office/powerpoint/2010/main" Requires="p14">
+  <mc:AlternateContent xmlns:mc="http://schemas.openxmlformats.org/markup-compatibility/2006" xmlns:p14="http://schemas.microsoft.com/office/powerpoint/2010/main">
+    <mc:Choice Requires="p14">
       <p:transition p14:dur="350">
         <p:fade/>
       </p:transition>
     </mc:Choice>
-    <mc:Fallback>
+    <mc:Fallback xmlns="">
       <p:transition>
         <p:fade/>
       </p:transition>
@@ -5541,13 +5642,13 @@
   <p:clrMapOvr>
     <a:masterClrMapping/>
   </p:clrMapOvr>
-  <mc:AlternateContent xmlns:mc="http://schemas.openxmlformats.org/markup-compatibility/2006">
-    <mc:Choice xmlns:p14="http://schemas.microsoft.com/office/powerpoint/2010/main" Requires="p14">
+  <mc:AlternateContent xmlns:mc="http://schemas.openxmlformats.org/markup-compatibility/2006" xmlns:p14="http://schemas.microsoft.com/office/powerpoint/2010/main">
+    <mc:Choice Requires="p14">
       <p:transition p14:dur="350">
         <p:fade/>
       </p:transition>
     </mc:Choice>
-    <mc:Fallback>
+    <mc:Fallback xmlns="">
       <p:transition>
         <p:fade/>
       </p:transition>
@@ -5699,13 +5800,13 @@
   <p:clrMapOvr>
     <a:masterClrMapping/>
   </p:clrMapOvr>
-  <mc:AlternateContent xmlns:mc="http://schemas.openxmlformats.org/markup-compatibility/2006">
-    <mc:Choice xmlns:p14="http://schemas.microsoft.com/office/powerpoint/2010/main" Requires="p14">
+  <mc:AlternateContent xmlns:mc="http://schemas.openxmlformats.org/markup-compatibility/2006" xmlns:p14="http://schemas.microsoft.com/office/powerpoint/2010/main">
+    <mc:Choice Requires="p14">
       <p:transition p14:dur="350">
         <p:fade/>
       </p:transition>
     </mc:Choice>
-    <mc:Fallback>
+    <mc:Fallback xmlns="">
       <p:transition>
         <p:fade/>
       </p:transition>
@@ -5778,7 +5879,7 @@
           <a:p>
             <a:r>
               <a:rPr lang="en-US" dirty="0" smtClean="0"/>
-              <a:t>IT is creating nightly and incremental backups using VSS</a:t>
+              <a:t>IT creates nightly and incremental backups using VSS</a:t>
             </a:r>
           </a:p>
           <a:p>
@@ -5838,13 +5939,13 @@
   <p:clrMapOvr>
     <a:masterClrMapping/>
   </p:clrMapOvr>
-  <mc:AlternateContent xmlns:mc="http://schemas.openxmlformats.org/markup-compatibility/2006">
-    <mc:Choice xmlns:p14="http://schemas.microsoft.com/office/powerpoint/2010/main" Requires="p14">
+  <mc:AlternateContent xmlns:mc="http://schemas.openxmlformats.org/markup-compatibility/2006" xmlns:p14="http://schemas.microsoft.com/office/powerpoint/2010/main">
+    <mc:Choice Requires="p14">
       <p:transition p14:dur="350">
         <p:fade/>
       </p:transition>
     </mc:Choice>
-    <mc:Fallback>
+    <mc:Fallback xmlns="">
       <p:transition>
         <p:fade/>
       </p:transition>
@@ -5958,20 +6059,6 @@
             <a:r>
               <a:rPr lang="en-US" dirty="0" smtClean="0"/>
               <a:t>RTFM</a:t>
-            </a:r>
-          </a:p>
-          <a:p>
-            <a:r>
-              <a:rPr lang="en-US" dirty="0" smtClean="0"/>
-              <a:t>Make </a:t>
-            </a:r>
-            <a:r>
-              <a:rPr lang="en-US" dirty="0" err="1" smtClean="0"/>
-              <a:t>RavenDB</a:t>
-            </a:r>
-            <a:r>
-              <a:rPr lang="en-US" dirty="0" smtClean="0"/>
-              <a:t> work for you, not against you</a:t>
             </a:r>
           </a:p>
         </p:txBody>
@@ -6057,13 +6144,13 @@
   <p:clrMapOvr>
     <a:masterClrMapping/>
   </p:clrMapOvr>
-  <mc:AlternateContent xmlns:mc="http://schemas.openxmlformats.org/markup-compatibility/2006">
-    <mc:Choice xmlns:p14="http://schemas.microsoft.com/office/powerpoint/2010/main" Requires="p14">
+  <mc:AlternateContent xmlns:mc="http://schemas.openxmlformats.org/markup-compatibility/2006" xmlns:p14="http://schemas.microsoft.com/office/powerpoint/2010/main">
+    <mc:Choice Requires="p14">
       <p:transition p14:dur="350">
         <p:fade/>
       </p:transition>
     </mc:Choice>
-    <mc:Fallback>
+    <mc:Fallback xmlns="">
       <p:transition>
         <p:fade/>
       </p:transition>

</xml_diff>